<commit_message>
Extended LSI presentation (LSI.pptx/LSI.pdf) Added Scripting Examples (.docx/.pdf)
</commit_message>
<xml_diff>
--- a/Intermediate/handout and presentation/LSI.pptx
+++ b/Intermediate/handout and presentation/LSI.pptx
@@ -1,31 +1,33 @@
 
 <file path=ppt/presentation.xml><?xml version="1.0" encoding="utf-8"?>
-<p:presentation xmlns:a="http://schemas.openxmlformats.org/drawingml/2006/main" xmlns:r="http://schemas.openxmlformats.org/officeDocument/2006/relationships" xmlns:mc="http://schemas.openxmlformats.org/markup-compatibility/2006" xmlns:mv="urn:schemas-microsoft-com:mac:vml" xmlns:p="http://schemas.openxmlformats.org/presentationml/2006/main" mc:Ignorable="mv" mc:PreserveAttributes="mv:*" saveSubsetFonts="1" autoCompressPictures="0">
+<p:presentation xmlns:a="http://schemas.openxmlformats.org/drawingml/2006/main" xmlns:r="http://schemas.openxmlformats.org/officeDocument/2006/relationships" xmlns:p="http://schemas.openxmlformats.org/presentationml/2006/main" saveSubsetFonts="1" autoCompressPictures="0">
   <p:sldMasterIdLst>
     <p:sldMasterId id="2147483648" r:id="rId1"/>
   </p:sldMasterIdLst>
   <p:notesMasterIdLst>
-    <p:notesMasterId r:id="rId20"/>
+    <p:notesMasterId r:id="rId22"/>
   </p:notesMasterIdLst>
   <p:sldIdLst>
     <p:sldId id="273" r:id="rId2"/>
-    <p:sldId id="256" r:id="rId3"/>
-    <p:sldId id="257" r:id="rId4"/>
-    <p:sldId id="258" r:id="rId5"/>
-    <p:sldId id="259" r:id="rId6"/>
-    <p:sldId id="260" r:id="rId7"/>
-    <p:sldId id="261" r:id="rId8"/>
-    <p:sldId id="262" r:id="rId9"/>
-    <p:sldId id="263" r:id="rId10"/>
-    <p:sldId id="264" r:id="rId11"/>
-    <p:sldId id="265" r:id="rId12"/>
-    <p:sldId id="266" r:id="rId13"/>
-    <p:sldId id="272" r:id="rId14"/>
-    <p:sldId id="267" r:id="rId15"/>
-    <p:sldId id="268" r:id="rId16"/>
-    <p:sldId id="269" r:id="rId17"/>
-    <p:sldId id="270" r:id="rId18"/>
-    <p:sldId id="271" r:id="rId19"/>
+    <p:sldId id="274" r:id="rId3"/>
+    <p:sldId id="256" r:id="rId4"/>
+    <p:sldId id="257" r:id="rId5"/>
+    <p:sldId id="258" r:id="rId6"/>
+    <p:sldId id="259" r:id="rId7"/>
+    <p:sldId id="260" r:id="rId8"/>
+    <p:sldId id="261" r:id="rId9"/>
+    <p:sldId id="262" r:id="rId10"/>
+    <p:sldId id="263" r:id="rId11"/>
+    <p:sldId id="264" r:id="rId12"/>
+    <p:sldId id="275" r:id="rId13"/>
+    <p:sldId id="265" r:id="rId14"/>
+    <p:sldId id="266" r:id="rId15"/>
+    <p:sldId id="272" r:id="rId16"/>
+    <p:sldId id="267" r:id="rId17"/>
+    <p:sldId id="268" r:id="rId18"/>
+    <p:sldId id="269" r:id="rId19"/>
+    <p:sldId id="270" r:id="rId20"/>
+    <p:sldId id="271" r:id="rId21"/>
   </p:sldIdLst>
   <p:sldSz cx="9144000" cy="6858000" type="screen4x3"/>
   <p:notesSz cx="6858000" cy="9144000"/>
@@ -158,7 +160,7 @@
 </file>
 
 <file path=ppt/notesMasters/notesMaster1.xml><?xml version="1.0" encoding="utf-8"?>
-<p:notesMaster xmlns:a="http://schemas.openxmlformats.org/drawingml/2006/main" xmlns:r="http://schemas.openxmlformats.org/officeDocument/2006/relationships" xmlns:mc="http://schemas.openxmlformats.org/markup-compatibility/2006" xmlns:mv="urn:schemas-microsoft-com:mac:vml" xmlns:p="http://schemas.openxmlformats.org/presentationml/2006/main" mc:Ignorable="mv" mc:PreserveAttributes="mv:*">
+<p:notesMaster xmlns:a="http://schemas.openxmlformats.org/drawingml/2006/main" xmlns:r="http://schemas.openxmlformats.org/officeDocument/2006/relationships" xmlns:p="http://schemas.openxmlformats.org/presentationml/2006/main">
   <p:cSld>
     <p:bg>
       <p:bgRef idx="1001">
@@ -268,7 +270,7 @@
               <a:pPr>
                 <a:defRPr/>
               </a:pPr>
-              <a:t>5/26/13</a:t>
+              <a:t>20.05.14</a:t>
             </a:fld>
             <a:endParaRPr lang="en-US"/>
           </a:p>
@@ -466,6 +468,11 @@
         </p:txBody>
       </p:sp>
     </p:spTree>
+    <p:extLst>
+      <p:ext uri="{BB962C8B-B14F-4D97-AF65-F5344CB8AC3E}">
+        <p14:creationId xmlns:p14="http://schemas.microsoft.com/office/powerpoint/2010/main" val="160380840"/>
+      </p:ext>
+    </p:extLst>
   </p:cSld>
   <p:clrMap bg1="lt1" tx1="dk1" bg2="lt2" tx2="dk2" accent1="accent1" accent2="accent2" accent3="accent3" accent4="accent4" accent5="accent5" accent6="accent6" hlink="hlink" folHlink="folHlink"/>
   <p:notesStyle>
@@ -594,7 +601,7 @@
 </file>
 
 <file path=ppt/notesSlides/notesSlide1.xml><?xml version="1.0" encoding="utf-8"?>
-<p:notes xmlns:a="http://schemas.openxmlformats.org/drawingml/2006/main" xmlns:r="http://schemas.openxmlformats.org/officeDocument/2006/relationships" xmlns:mc="http://schemas.openxmlformats.org/markup-compatibility/2006" xmlns:mv="urn:schemas-microsoft-com:mac:vml" xmlns:p="http://schemas.openxmlformats.org/presentationml/2006/main" mc:Ignorable="mv" mc:PreserveAttributes="mv:*">
+<p:notes xmlns:a="http://schemas.openxmlformats.org/drawingml/2006/main" xmlns:r="http://schemas.openxmlformats.org/officeDocument/2006/relationships" xmlns:p="http://schemas.openxmlformats.org/presentationml/2006/main">
   <p:cSld>
     <p:spTree>
       <p:nvGrpSpPr>
@@ -659,9 +666,22 @@
               </a:spcBef>
             </a:pPr>
             <a:r>
-              <a:rPr lang="en-US" smtClean="0"/>
-              <a:t>PLEASE CORRECT IN SCRIPT: $MYDIR=/etc -&gt; MYDIR=/etc</a:t>
-            </a:r>
+              <a:rPr lang="en-US" dirty="0" smtClean="0"/>
+              <a:t>PLEASE CORRECT IN SCRIPT: $MYDIR=/</a:t>
+            </a:r>
+            <a:r>
+              <a:rPr lang="en-US" dirty="0" err="1" smtClean="0"/>
+              <a:t>etc</a:t>
+            </a:r>
+            <a:r>
+              <a:rPr lang="en-US" dirty="0" smtClean="0"/>
+              <a:t> -&gt; MYDIR=/</a:t>
+            </a:r>
+            <a:r>
+              <a:rPr lang="en-US" dirty="0" err="1" smtClean="0"/>
+              <a:t>etc</a:t>
+            </a:r>
+            <a:endParaRPr lang="en-US" dirty="0" smtClean="0"/>
           </a:p>
         </p:txBody>
       </p:sp>
@@ -712,7 +732,7 @@
                   <a:spcPct val="0"/>
                 </a:spcAft>
               </a:pPr>
-              <a:t>10</a:t>
+              <a:t>11</a:t>
             </a:fld>
             <a:endParaRPr lang="en-US">
               <a:ea typeface="ＭＳ Ｐゴシック" pitchFamily="-72" charset="-128"/>
@@ -729,8 +749,8 @@
 </p:notes>
 </file>
 
-<file path=ppt/notesSlides/notesSlide2.xml><?xml version="1.0" encoding="utf-8"?>
-<p:notes xmlns:a="http://schemas.openxmlformats.org/drawingml/2006/main" xmlns:r="http://schemas.openxmlformats.org/officeDocument/2006/relationships" xmlns:mc="http://schemas.openxmlformats.org/markup-compatibility/2006" xmlns:mv="urn:schemas-microsoft-com:mac:vml" xmlns:p="http://schemas.openxmlformats.org/presentationml/2006/main" mc:Ignorable="mv" mc:PreserveAttributes="mv:*">
+<file path=ppt/notesSlides/notesSlide10.xml><?xml version="1.0" encoding="utf-8"?>
+<p:notes xmlns:a="http://schemas.openxmlformats.org/drawingml/2006/main" xmlns:r="http://schemas.openxmlformats.org/officeDocument/2006/relationships" xmlns:p="http://schemas.openxmlformats.org/presentationml/2006/main">
   <p:cSld>
     <p:spTree>
       <p:nvGrpSpPr>
@@ -748,7 +768,7 @@
       </p:grpSpPr>
       <p:sp>
         <p:nvSpPr>
-          <p:cNvPr id="25601" name="Slide Image Placeholder 1"/>
+          <p:cNvPr id="37889" name="Slide Image Placeholder 1"/>
           <p:cNvSpPr>
             <a:spLocks noGrp="1" noRot="1" noChangeAspect="1"/>
           </p:cNvSpPr>
@@ -770,7 +790,7 @@
       </p:sp>
       <p:sp>
         <p:nvSpPr>
-          <p:cNvPr id="25602" name="Notes Placeholder 2"/>
+          <p:cNvPr id="37890" name="Notes Placeholder 2"/>
           <p:cNvSpPr>
             <a:spLocks noGrp="1"/>
           </p:cNvSpPr>
@@ -803,7 +823,7 @@
       </p:sp>
       <p:sp>
         <p:nvSpPr>
-          <p:cNvPr id="25603" name="Slide Number Placeholder 3"/>
+          <p:cNvPr id="37891" name="Slide Number Placeholder 3"/>
           <p:cNvSpPr>
             <a:spLocks noGrp="1"/>
           </p:cNvSpPr>
@@ -835,7 +855,7 @@
                 <a:spcPct val="0"/>
               </a:spcAft>
             </a:pPr>
-            <a:fld id="{59B5470C-255E-48B8-AA73-D989A3999983}" type="slidenum">
+            <a:fld id="{37E937D8-F251-47E1-9800-A1356965D5F7}" type="slidenum">
               <a:rPr lang="en-US">
                 <a:ea typeface="ＭＳ Ｐゴシック" pitchFamily="-72" charset="-128"/>
                 <a:cs typeface="ＭＳ Ｐゴシック" pitchFamily="-72" charset="-128"/>
@@ -848,7 +868,7 @@
                   <a:spcPct val="0"/>
                 </a:spcAft>
               </a:pPr>
-              <a:t>11</a:t>
+              <a:t>20</a:t>
             </a:fld>
             <a:endParaRPr lang="en-US">
               <a:ea typeface="ＭＳ Ｐゴシック" pitchFamily="-72" charset="-128"/>
@@ -865,8 +885,8 @@
 </p:notes>
 </file>
 
-<file path=ppt/notesSlides/notesSlide3.xml><?xml version="1.0" encoding="utf-8"?>
-<p:notes xmlns:a="http://schemas.openxmlformats.org/drawingml/2006/main" xmlns:r="http://schemas.openxmlformats.org/officeDocument/2006/relationships" xmlns:mc="http://schemas.openxmlformats.org/markup-compatibility/2006" xmlns:mv="urn:schemas-microsoft-com:mac:vml" xmlns:p="http://schemas.openxmlformats.org/presentationml/2006/main" mc:Ignorable="mv" mc:PreserveAttributes="mv:*">
+<file path=ppt/notesSlides/notesSlide2.xml><?xml version="1.0" encoding="utf-8"?>
+<p:notes xmlns:a="http://schemas.openxmlformats.org/drawingml/2006/main" xmlns:r="http://schemas.openxmlformats.org/officeDocument/2006/relationships" xmlns:p="http://schemas.openxmlformats.org/presentationml/2006/main">
   <p:cSld>
     <p:spTree>
       <p:nvGrpSpPr>
@@ -884,7 +904,7 @@
       </p:grpSpPr>
       <p:sp>
         <p:nvSpPr>
-          <p:cNvPr id="27649" name="Slide Image Placeholder 1"/>
+          <p:cNvPr id="23553" name="Slide Image Placeholder 1"/>
           <p:cNvSpPr>
             <a:spLocks noGrp="1" noRot="1" noChangeAspect="1"/>
           </p:cNvSpPr>
@@ -906,7 +926,7 @@
       </p:sp>
       <p:sp>
         <p:nvSpPr>
-          <p:cNvPr id="27650" name="Notes Placeholder 2"/>
+          <p:cNvPr id="23554" name="Notes Placeholder 2"/>
           <p:cNvSpPr>
             <a:spLocks noGrp="1"/>
           </p:cNvSpPr>
@@ -931,7 +951,7 @@
               </a:spcBef>
             </a:pPr>
             <a:r>
-              <a:rPr lang="en-US" sz="2000" smtClean="0"/>
+              <a:rPr lang="en-US" smtClean="0"/>
               <a:t>PLEASE CORRECT IN SCRIPT: $MYDIR=/etc -&gt; MYDIR=/etc</a:t>
             </a:r>
           </a:p>
@@ -939,7 +959,7 @@
       </p:sp>
       <p:sp>
         <p:nvSpPr>
-          <p:cNvPr id="27651" name="Slide Number Placeholder 3"/>
+          <p:cNvPr id="23555" name="Slide Number Placeholder 3"/>
           <p:cNvSpPr>
             <a:spLocks noGrp="1"/>
           </p:cNvSpPr>
@@ -971,7 +991,7 @@
                 <a:spcPct val="0"/>
               </a:spcAft>
             </a:pPr>
-            <a:fld id="{78533AF9-1166-42C1-9FE8-08069315B20D}" type="slidenum">
+            <a:fld id="{9A36DF8A-3F0E-4648-8EEA-F041E8F7239C}" type="slidenum">
               <a:rPr lang="en-US">
                 <a:ea typeface="ＭＳ Ｐゴシック" pitchFamily="-72" charset="-128"/>
                 <a:cs typeface="ＭＳ Ｐゴシック" pitchFamily="-72" charset="-128"/>
@@ -1001,8 +1021,280 @@
 </p:notes>
 </file>
 
+<file path=ppt/notesSlides/notesSlide3.xml><?xml version="1.0" encoding="utf-8"?>
+<p:notes xmlns:a="http://schemas.openxmlformats.org/drawingml/2006/main" xmlns:r="http://schemas.openxmlformats.org/officeDocument/2006/relationships" xmlns:p="http://schemas.openxmlformats.org/presentationml/2006/main">
+  <p:cSld>
+    <p:spTree>
+      <p:nvGrpSpPr>
+        <p:cNvPr id="1" name=""/>
+        <p:cNvGrpSpPr/>
+        <p:nvPr/>
+      </p:nvGrpSpPr>
+      <p:grpSpPr>
+        <a:xfrm>
+          <a:off x="0" y="0"/>
+          <a:ext cx="0" cy="0"/>
+          <a:chOff x="0" y="0"/>
+          <a:chExt cx="0" cy="0"/>
+        </a:xfrm>
+      </p:grpSpPr>
+      <p:sp>
+        <p:nvSpPr>
+          <p:cNvPr id="25601" name="Slide Image Placeholder 1"/>
+          <p:cNvSpPr>
+            <a:spLocks noGrp="1" noRot="1" noChangeAspect="1"/>
+          </p:cNvSpPr>
+          <p:nvPr>
+            <p:ph type="sldImg"/>
+          </p:nvPr>
+        </p:nvSpPr>
+        <p:spPr bwMode="auto">
+          <a:noFill/>
+          <a:ln>
+            <a:solidFill>
+              <a:srgbClr val="000000"/>
+            </a:solidFill>
+            <a:miter lim="800000"/>
+            <a:headEnd/>
+            <a:tailEnd/>
+          </a:ln>
+        </p:spPr>
+      </p:sp>
+      <p:sp>
+        <p:nvSpPr>
+          <p:cNvPr id="25602" name="Notes Placeholder 2"/>
+          <p:cNvSpPr>
+            <a:spLocks noGrp="1"/>
+          </p:cNvSpPr>
+          <p:nvPr>
+            <p:ph type="body" idx="1"/>
+          </p:nvPr>
+        </p:nvSpPr>
+        <p:spPr bwMode="auto">
+          <a:noFill/>
+        </p:spPr>
+        <p:txBody>
+          <a:bodyPr wrap="square" numCol="1" anchor="t" anchorCtr="0" compatLnSpc="1">
+            <a:prstTxWarp prst="textNoShape">
+              <a:avLst/>
+            </a:prstTxWarp>
+          </a:bodyPr>
+          <a:lstStyle/>
+          <a:p>
+            <a:pPr>
+              <a:spcBef>
+                <a:spcPct val="0"/>
+              </a:spcBef>
+            </a:pPr>
+            <a:r>
+              <a:rPr lang="en-US" sz="2000" smtClean="0"/>
+              <a:t>PLEASE CORRECT IN SCRIPT: $MYDIR=/etc -&gt; MYDIR=/etc</a:t>
+            </a:r>
+          </a:p>
+        </p:txBody>
+      </p:sp>
+      <p:sp>
+        <p:nvSpPr>
+          <p:cNvPr id="25603" name="Slide Number Placeholder 3"/>
+          <p:cNvSpPr>
+            <a:spLocks noGrp="1"/>
+          </p:cNvSpPr>
+          <p:nvPr>
+            <p:ph type="sldNum" sz="quarter" idx="5"/>
+          </p:nvPr>
+        </p:nvSpPr>
+        <p:spPr bwMode="auto">
+          <a:noFill/>
+          <a:ln>
+            <a:miter lim="800000"/>
+            <a:headEnd/>
+            <a:tailEnd/>
+          </a:ln>
+        </p:spPr>
+        <p:txBody>
+          <a:bodyPr wrap="square" numCol="1" anchorCtr="0" compatLnSpc="1">
+            <a:prstTxWarp prst="textNoShape">
+              <a:avLst/>
+            </a:prstTxWarp>
+          </a:bodyPr>
+          <a:lstStyle/>
+          <a:p>
+            <a:pPr fontAlgn="base">
+              <a:spcBef>
+                <a:spcPct val="0"/>
+              </a:spcBef>
+              <a:spcAft>
+                <a:spcPct val="0"/>
+              </a:spcAft>
+            </a:pPr>
+            <a:fld id="{59B5470C-255E-48B8-AA73-D989A3999983}" type="slidenum">
+              <a:rPr lang="en-US">
+                <a:ea typeface="ＭＳ Ｐゴシック" pitchFamily="-72" charset="-128"/>
+                <a:cs typeface="ＭＳ Ｐゴシック" pitchFamily="-72" charset="-128"/>
+              </a:rPr>
+              <a:pPr fontAlgn="base">
+                <a:spcBef>
+                  <a:spcPct val="0"/>
+                </a:spcBef>
+                <a:spcAft>
+                  <a:spcPct val="0"/>
+                </a:spcAft>
+              </a:pPr>
+              <a:t>13</a:t>
+            </a:fld>
+            <a:endParaRPr lang="en-US">
+              <a:ea typeface="ＭＳ Ｐゴシック" pitchFamily="-72" charset="-128"/>
+              <a:cs typeface="ＭＳ Ｐゴシック" pitchFamily="-72" charset="-128"/>
+            </a:endParaRPr>
+          </a:p>
+        </p:txBody>
+      </p:sp>
+    </p:spTree>
+  </p:cSld>
+  <p:clrMapOvr>
+    <a:masterClrMapping/>
+  </p:clrMapOvr>
+</p:notes>
+</file>
+
 <file path=ppt/notesSlides/notesSlide4.xml><?xml version="1.0" encoding="utf-8"?>
-<p:notes xmlns:a="http://schemas.openxmlformats.org/drawingml/2006/main" xmlns:r="http://schemas.openxmlformats.org/officeDocument/2006/relationships" xmlns:mc="http://schemas.openxmlformats.org/markup-compatibility/2006" xmlns:mv="urn:schemas-microsoft-com:mac:vml" xmlns:p="http://schemas.openxmlformats.org/presentationml/2006/main" mc:Ignorable="mv" mc:PreserveAttributes="mv:*">
+<p:notes xmlns:a="http://schemas.openxmlformats.org/drawingml/2006/main" xmlns:r="http://schemas.openxmlformats.org/officeDocument/2006/relationships" xmlns:p="http://schemas.openxmlformats.org/presentationml/2006/main">
+  <p:cSld>
+    <p:spTree>
+      <p:nvGrpSpPr>
+        <p:cNvPr id="1" name=""/>
+        <p:cNvGrpSpPr/>
+        <p:nvPr/>
+      </p:nvGrpSpPr>
+      <p:grpSpPr>
+        <a:xfrm>
+          <a:off x="0" y="0"/>
+          <a:ext cx="0" cy="0"/>
+          <a:chOff x="0" y="0"/>
+          <a:chExt cx="0" cy="0"/>
+        </a:xfrm>
+      </p:grpSpPr>
+      <p:sp>
+        <p:nvSpPr>
+          <p:cNvPr id="27649" name="Slide Image Placeholder 1"/>
+          <p:cNvSpPr>
+            <a:spLocks noGrp="1" noRot="1" noChangeAspect="1"/>
+          </p:cNvSpPr>
+          <p:nvPr>
+            <p:ph type="sldImg"/>
+          </p:nvPr>
+        </p:nvSpPr>
+        <p:spPr bwMode="auto">
+          <a:noFill/>
+          <a:ln>
+            <a:solidFill>
+              <a:srgbClr val="000000"/>
+            </a:solidFill>
+            <a:miter lim="800000"/>
+            <a:headEnd/>
+            <a:tailEnd/>
+          </a:ln>
+        </p:spPr>
+      </p:sp>
+      <p:sp>
+        <p:nvSpPr>
+          <p:cNvPr id="27650" name="Notes Placeholder 2"/>
+          <p:cNvSpPr>
+            <a:spLocks noGrp="1"/>
+          </p:cNvSpPr>
+          <p:nvPr>
+            <p:ph type="body" idx="1"/>
+          </p:nvPr>
+        </p:nvSpPr>
+        <p:spPr bwMode="auto">
+          <a:noFill/>
+        </p:spPr>
+        <p:txBody>
+          <a:bodyPr wrap="square" numCol="1" anchor="t" anchorCtr="0" compatLnSpc="1">
+            <a:prstTxWarp prst="textNoShape">
+              <a:avLst/>
+            </a:prstTxWarp>
+          </a:bodyPr>
+          <a:lstStyle/>
+          <a:p>
+            <a:pPr>
+              <a:spcBef>
+                <a:spcPct val="0"/>
+              </a:spcBef>
+            </a:pPr>
+            <a:r>
+              <a:rPr lang="en-US" sz="2000" smtClean="0"/>
+              <a:t>PLEASE CORRECT IN SCRIPT: $MYDIR=/etc -&gt; MYDIR=/etc</a:t>
+            </a:r>
+          </a:p>
+        </p:txBody>
+      </p:sp>
+      <p:sp>
+        <p:nvSpPr>
+          <p:cNvPr id="27651" name="Slide Number Placeholder 3"/>
+          <p:cNvSpPr>
+            <a:spLocks noGrp="1"/>
+          </p:cNvSpPr>
+          <p:nvPr>
+            <p:ph type="sldNum" sz="quarter" idx="5"/>
+          </p:nvPr>
+        </p:nvSpPr>
+        <p:spPr bwMode="auto">
+          <a:noFill/>
+          <a:ln>
+            <a:miter lim="800000"/>
+            <a:headEnd/>
+            <a:tailEnd/>
+          </a:ln>
+        </p:spPr>
+        <p:txBody>
+          <a:bodyPr wrap="square" numCol="1" anchorCtr="0" compatLnSpc="1">
+            <a:prstTxWarp prst="textNoShape">
+              <a:avLst/>
+            </a:prstTxWarp>
+          </a:bodyPr>
+          <a:lstStyle/>
+          <a:p>
+            <a:pPr fontAlgn="base">
+              <a:spcBef>
+                <a:spcPct val="0"/>
+              </a:spcBef>
+              <a:spcAft>
+                <a:spcPct val="0"/>
+              </a:spcAft>
+            </a:pPr>
+            <a:fld id="{78533AF9-1166-42C1-9FE8-08069315B20D}" type="slidenum">
+              <a:rPr lang="en-US">
+                <a:ea typeface="ＭＳ Ｐゴシック" pitchFamily="-72" charset="-128"/>
+                <a:cs typeface="ＭＳ Ｐゴシック" pitchFamily="-72" charset="-128"/>
+              </a:rPr>
+              <a:pPr fontAlgn="base">
+                <a:spcBef>
+                  <a:spcPct val="0"/>
+                </a:spcBef>
+                <a:spcAft>
+                  <a:spcPct val="0"/>
+                </a:spcAft>
+              </a:pPr>
+              <a:t>14</a:t>
+            </a:fld>
+            <a:endParaRPr lang="en-US">
+              <a:ea typeface="ＭＳ Ｐゴシック" pitchFamily="-72" charset="-128"/>
+              <a:cs typeface="ＭＳ Ｐゴシック" pitchFamily="-72" charset="-128"/>
+            </a:endParaRPr>
+          </a:p>
+        </p:txBody>
+      </p:sp>
+    </p:spTree>
+  </p:cSld>
+  <p:clrMapOvr>
+    <a:masterClrMapping/>
+  </p:clrMapOvr>
+</p:notes>
+</file>
+
+<file path=ppt/notesSlides/notesSlide5.xml><?xml version="1.0" encoding="utf-8"?>
+<p:notes xmlns:a="http://schemas.openxmlformats.org/drawingml/2006/main" xmlns:r="http://schemas.openxmlformats.org/officeDocument/2006/relationships" xmlns:p="http://schemas.openxmlformats.org/presentationml/2006/main">
   <p:cSld>
     <p:spTree>
       <p:nvGrpSpPr>
@@ -1137,7 +1429,7 @@
                 <a:latin typeface="Calibri" pitchFamily="-72" charset="0"/>
               </a:rPr>
               <a:pPr algn="r"/>
-              <a:t>13</a:t>
+              <a:t>15</a:t>
             </a:fld>
             <a:endParaRPr lang="en-US" sz="1200">
               <a:latin typeface="Calibri" pitchFamily="-72" charset="0"/>
@@ -1153,8 +1445,8 @@
 </p:notes>
 </file>
 
-<file path=ppt/notesSlides/notesSlide5.xml><?xml version="1.0" encoding="utf-8"?>
-<p:notes xmlns:a="http://schemas.openxmlformats.org/drawingml/2006/main" xmlns:r="http://schemas.openxmlformats.org/officeDocument/2006/relationships" xmlns:mc="http://schemas.openxmlformats.org/markup-compatibility/2006" xmlns:mv="urn:schemas-microsoft-com:mac:vml" xmlns:p="http://schemas.openxmlformats.org/presentationml/2006/main" mc:Ignorable="mv" mc:PreserveAttributes="mv:*">
+<file path=ppt/notesSlides/notesSlide6.xml><?xml version="1.0" encoding="utf-8"?>
+<p:notes xmlns:a="http://schemas.openxmlformats.org/drawingml/2006/main" xmlns:r="http://schemas.openxmlformats.org/officeDocument/2006/relationships" xmlns:p="http://schemas.openxmlformats.org/presentationml/2006/main">
   <p:cSld>
     <p:spTree>
       <p:nvGrpSpPr>
@@ -1272,7 +1564,7 @@
                   <a:spcPct val="0"/>
                 </a:spcAft>
               </a:pPr>
-              <a:t>14</a:t>
+              <a:t>16</a:t>
             </a:fld>
             <a:endParaRPr lang="en-US">
               <a:ea typeface="ＭＳ Ｐゴシック" pitchFamily="-72" charset="-128"/>
@@ -1289,8 +1581,8 @@
 </p:notes>
 </file>
 
-<file path=ppt/notesSlides/notesSlide6.xml><?xml version="1.0" encoding="utf-8"?>
-<p:notes xmlns:a="http://schemas.openxmlformats.org/drawingml/2006/main" xmlns:r="http://schemas.openxmlformats.org/officeDocument/2006/relationships" xmlns:mc="http://schemas.openxmlformats.org/markup-compatibility/2006" xmlns:mv="urn:schemas-microsoft-com:mac:vml" xmlns:p="http://schemas.openxmlformats.org/presentationml/2006/main" mc:Ignorable="mv" mc:PreserveAttributes="mv:*">
+<file path=ppt/notesSlides/notesSlide7.xml><?xml version="1.0" encoding="utf-8"?>
+<p:notes xmlns:a="http://schemas.openxmlformats.org/drawingml/2006/main" xmlns:r="http://schemas.openxmlformats.org/officeDocument/2006/relationships" xmlns:p="http://schemas.openxmlformats.org/presentationml/2006/main">
   <p:cSld>
     <p:spTree>
       <p:nvGrpSpPr>
@@ -1408,7 +1700,7 @@
                   <a:spcPct val="0"/>
                 </a:spcAft>
               </a:pPr>
-              <a:t>15</a:t>
+              <a:t>17</a:t>
             </a:fld>
             <a:endParaRPr lang="en-US">
               <a:ea typeface="ＭＳ Ｐゴシック" pitchFamily="-72" charset="-128"/>
@@ -1425,8 +1717,8 @@
 </p:notes>
 </file>
 
-<file path=ppt/notesSlides/notesSlide7.xml><?xml version="1.0" encoding="utf-8"?>
-<p:notes xmlns:a="http://schemas.openxmlformats.org/drawingml/2006/main" xmlns:r="http://schemas.openxmlformats.org/officeDocument/2006/relationships" xmlns:mc="http://schemas.openxmlformats.org/markup-compatibility/2006" xmlns:mv="urn:schemas-microsoft-com:mac:vml" xmlns:p="http://schemas.openxmlformats.org/presentationml/2006/main" mc:Ignorable="mv" mc:PreserveAttributes="mv:*">
+<file path=ppt/notesSlides/notesSlide8.xml><?xml version="1.0" encoding="utf-8"?>
+<p:notes xmlns:a="http://schemas.openxmlformats.org/drawingml/2006/main" xmlns:r="http://schemas.openxmlformats.org/officeDocument/2006/relationships" xmlns:p="http://schemas.openxmlformats.org/presentationml/2006/main">
   <p:cSld>
     <p:spTree>
       <p:nvGrpSpPr>
@@ -1544,7 +1836,7 @@
                   <a:spcPct val="0"/>
                 </a:spcAft>
               </a:pPr>
-              <a:t>16</a:t>
+              <a:t>18</a:t>
             </a:fld>
             <a:endParaRPr lang="en-US">
               <a:ea typeface="ＭＳ Ｐゴシック" pitchFamily="-72" charset="-128"/>
@@ -1561,8 +1853,8 @@
 </p:notes>
 </file>
 
-<file path=ppt/notesSlides/notesSlide8.xml><?xml version="1.0" encoding="utf-8"?>
-<p:notes xmlns:a="http://schemas.openxmlformats.org/drawingml/2006/main" xmlns:r="http://schemas.openxmlformats.org/officeDocument/2006/relationships" xmlns:mc="http://schemas.openxmlformats.org/markup-compatibility/2006" xmlns:mv="urn:schemas-microsoft-com:mac:vml" xmlns:p="http://schemas.openxmlformats.org/presentationml/2006/main" mc:Ignorable="mv" mc:PreserveAttributes="mv:*">
+<file path=ppt/notesSlides/notesSlide9.xml><?xml version="1.0" encoding="utf-8"?>
+<p:notes xmlns:a="http://schemas.openxmlformats.org/drawingml/2006/main" xmlns:r="http://schemas.openxmlformats.org/officeDocument/2006/relationships" xmlns:p="http://schemas.openxmlformats.org/presentationml/2006/main">
   <p:cSld>
     <p:spTree>
       <p:nvGrpSpPr>
@@ -1680,143 +1972,7 @@
                   <a:spcPct val="0"/>
                 </a:spcAft>
               </a:pPr>
-              <a:t>17</a:t>
-            </a:fld>
-            <a:endParaRPr lang="en-US">
-              <a:ea typeface="ＭＳ Ｐゴシック" pitchFamily="-72" charset="-128"/>
-              <a:cs typeface="ＭＳ Ｐゴシック" pitchFamily="-72" charset="-128"/>
-            </a:endParaRPr>
-          </a:p>
-        </p:txBody>
-      </p:sp>
-    </p:spTree>
-  </p:cSld>
-  <p:clrMapOvr>
-    <a:masterClrMapping/>
-  </p:clrMapOvr>
-</p:notes>
-</file>
-
-<file path=ppt/notesSlides/notesSlide9.xml><?xml version="1.0" encoding="utf-8"?>
-<p:notes xmlns:a="http://schemas.openxmlformats.org/drawingml/2006/main" xmlns:r="http://schemas.openxmlformats.org/officeDocument/2006/relationships" xmlns:mc="http://schemas.openxmlformats.org/markup-compatibility/2006" xmlns:mv="urn:schemas-microsoft-com:mac:vml" xmlns:p="http://schemas.openxmlformats.org/presentationml/2006/main" mc:Ignorable="mv" mc:PreserveAttributes="mv:*">
-  <p:cSld>
-    <p:spTree>
-      <p:nvGrpSpPr>
-        <p:cNvPr id="1" name=""/>
-        <p:cNvGrpSpPr/>
-        <p:nvPr/>
-      </p:nvGrpSpPr>
-      <p:grpSpPr>
-        <a:xfrm>
-          <a:off x="0" y="0"/>
-          <a:ext cx="0" cy="0"/>
-          <a:chOff x="0" y="0"/>
-          <a:chExt cx="0" cy="0"/>
-        </a:xfrm>
-      </p:grpSpPr>
-      <p:sp>
-        <p:nvSpPr>
-          <p:cNvPr id="37889" name="Slide Image Placeholder 1"/>
-          <p:cNvSpPr>
-            <a:spLocks noGrp="1" noRot="1" noChangeAspect="1"/>
-          </p:cNvSpPr>
-          <p:nvPr>
-            <p:ph type="sldImg"/>
-          </p:nvPr>
-        </p:nvSpPr>
-        <p:spPr bwMode="auto">
-          <a:noFill/>
-          <a:ln>
-            <a:solidFill>
-              <a:srgbClr val="000000"/>
-            </a:solidFill>
-            <a:miter lim="800000"/>
-            <a:headEnd/>
-            <a:tailEnd/>
-          </a:ln>
-        </p:spPr>
-      </p:sp>
-      <p:sp>
-        <p:nvSpPr>
-          <p:cNvPr id="37890" name="Notes Placeholder 2"/>
-          <p:cNvSpPr>
-            <a:spLocks noGrp="1"/>
-          </p:cNvSpPr>
-          <p:nvPr>
-            <p:ph type="body" idx="1"/>
-          </p:nvPr>
-        </p:nvSpPr>
-        <p:spPr bwMode="auto">
-          <a:noFill/>
-        </p:spPr>
-        <p:txBody>
-          <a:bodyPr wrap="square" numCol="1" anchor="t" anchorCtr="0" compatLnSpc="1">
-            <a:prstTxWarp prst="textNoShape">
-              <a:avLst/>
-            </a:prstTxWarp>
-          </a:bodyPr>
-          <a:lstStyle/>
-          <a:p>
-            <a:pPr>
-              <a:spcBef>
-                <a:spcPct val="0"/>
-              </a:spcBef>
-            </a:pPr>
-            <a:r>
-              <a:rPr lang="en-US" sz="2000" smtClean="0"/>
-              <a:t>PLEASE CORRECT IN SCRIPT: $MYDIR=/etc -&gt; MYDIR=/etc</a:t>
-            </a:r>
-          </a:p>
-        </p:txBody>
-      </p:sp>
-      <p:sp>
-        <p:nvSpPr>
-          <p:cNvPr id="37891" name="Slide Number Placeholder 3"/>
-          <p:cNvSpPr>
-            <a:spLocks noGrp="1"/>
-          </p:cNvSpPr>
-          <p:nvPr>
-            <p:ph type="sldNum" sz="quarter" idx="5"/>
-          </p:nvPr>
-        </p:nvSpPr>
-        <p:spPr bwMode="auto">
-          <a:noFill/>
-          <a:ln>
-            <a:miter lim="800000"/>
-            <a:headEnd/>
-            <a:tailEnd/>
-          </a:ln>
-        </p:spPr>
-        <p:txBody>
-          <a:bodyPr wrap="square" numCol="1" anchorCtr="0" compatLnSpc="1">
-            <a:prstTxWarp prst="textNoShape">
-              <a:avLst/>
-            </a:prstTxWarp>
-          </a:bodyPr>
-          <a:lstStyle/>
-          <a:p>
-            <a:pPr fontAlgn="base">
-              <a:spcBef>
-                <a:spcPct val="0"/>
-              </a:spcBef>
-              <a:spcAft>
-                <a:spcPct val="0"/>
-              </a:spcAft>
-            </a:pPr>
-            <a:fld id="{37E937D8-F251-47E1-9800-A1356965D5F7}" type="slidenum">
-              <a:rPr lang="en-US">
-                <a:ea typeface="ＭＳ Ｐゴシック" pitchFamily="-72" charset="-128"/>
-                <a:cs typeface="ＭＳ Ｐゴシック" pitchFamily="-72" charset="-128"/>
-              </a:rPr>
-              <a:pPr fontAlgn="base">
-                <a:spcBef>
-                  <a:spcPct val="0"/>
-                </a:spcBef>
-                <a:spcAft>
-                  <a:spcPct val="0"/>
-                </a:spcAft>
-              </a:pPr>
-              <a:t>18</a:t>
+              <a:t>19</a:t>
             </a:fld>
             <a:endParaRPr lang="en-US">
               <a:ea typeface="ＭＳ Ｐゴシック" pitchFamily="-72" charset="-128"/>
@@ -1834,7 +1990,7 @@
 </file>
 
 <file path=ppt/slideLayouts/slideLayout1.xml><?xml version="1.0" encoding="utf-8"?>
-<p:sldLayout xmlns:a="http://schemas.openxmlformats.org/drawingml/2006/main" xmlns:r="http://schemas.openxmlformats.org/officeDocument/2006/relationships" xmlns:mc="http://schemas.openxmlformats.org/markup-compatibility/2006" xmlns:mv="urn:schemas-microsoft-com:mac:vml" xmlns:p="http://schemas.openxmlformats.org/presentationml/2006/main" mc:Ignorable="mv" mc:PreserveAttributes="mv:*" type="title" preserve="1">
+<p:sldLayout xmlns:a="http://schemas.openxmlformats.org/drawingml/2006/main" xmlns:r="http://schemas.openxmlformats.org/officeDocument/2006/relationships" xmlns:p="http://schemas.openxmlformats.org/presentationml/2006/main" type="title" preserve="1">
   <p:cSld name="Title Slide">
     <p:spTree>
       <p:nvGrpSpPr>
@@ -2024,7 +2180,7 @@
               <a:pPr>
                 <a:defRPr/>
               </a:pPr>
-              <a:t>5/26/13</a:t>
+              <a:t>20.05.14</a:t>
             </a:fld>
             <a:endParaRPr lang="en-US"/>
           </a:p>
@@ -2098,7 +2254,7 @@
 </file>
 
 <file path=ppt/slideLayouts/slideLayout10.xml><?xml version="1.0" encoding="utf-8"?>
-<p:sldLayout xmlns:a="http://schemas.openxmlformats.org/drawingml/2006/main" xmlns:r="http://schemas.openxmlformats.org/officeDocument/2006/relationships" xmlns:mc="http://schemas.openxmlformats.org/markup-compatibility/2006" xmlns:mv="urn:schemas-microsoft-com:mac:vml" xmlns:p="http://schemas.openxmlformats.org/presentationml/2006/main" mc:Ignorable="mv" mc:PreserveAttributes="mv:*" type="vertTx" preserve="1">
+<p:sldLayout xmlns:a="http://schemas.openxmlformats.org/drawingml/2006/main" xmlns:r="http://schemas.openxmlformats.org/officeDocument/2006/relationships" xmlns:p="http://schemas.openxmlformats.org/presentationml/2006/main" type="vertTx" preserve="1">
   <p:cSld name="Title and Vertical Text">
     <p:spTree>
       <p:nvGrpSpPr>
@@ -2216,7 +2372,7 @@
               <a:pPr>
                 <a:defRPr/>
               </a:pPr>
-              <a:t>5/26/13</a:t>
+              <a:t>20.05.14</a:t>
             </a:fld>
             <a:endParaRPr lang="en-US"/>
           </a:p>
@@ -2290,7 +2446,7 @@
 </file>
 
 <file path=ppt/slideLayouts/slideLayout11.xml><?xml version="1.0" encoding="utf-8"?>
-<p:sldLayout xmlns:a="http://schemas.openxmlformats.org/drawingml/2006/main" xmlns:r="http://schemas.openxmlformats.org/officeDocument/2006/relationships" xmlns:mc="http://schemas.openxmlformats.org/markup-compatibility/2006" xmlns:mv="urn:schemas-microsoft-com:mac:vml" xmlns:p="http://schemas.openxmlformats.org/presentationml/2006/main" mc:Ignorable="mv" mc:PreserveAttributes="mv:*" type="vertTitleAndTx" preserve="1">
+<p:sldLayout xmlns:a="http://schemas.openxmlformats.org/drawingml/2006/main" xmlns:r="http://schemas.openxmlformats.org/officeDocument/2006/relationships" xmlns:p="http://schemas.openxmlformats.org/presentationml/2006/main" type="vertTitleAndTx" preserve="1">
   <p:cSld name="Vertical Title and Text">
     <p:spTree>
       <p:nvGrpSpPr>
@@ -2418,7 +2574,7 @@
               <a:pPr>
                 <a:defRPr/>
               </a:pPr>
-              <a:t>5/26/13</a:t>
+              <a:t>20.05.14</a:t>
             </a:fld>
             <a:endParaRPr lang="en-US"/>
           </a:p>
@@ -2492,7 +2648,7 @@
 </file>
 
 <file path=ppt/slideLayouts/slideLayout2.xml><?xml version="1.0" encoding="utf-8"?>
-<p:sldLayout xmlns:a="http://schemas.openxmlformats.org/drawingml/2006/main" xmlns:r="http://schemas.openxmlformats.org/officeDocument/2006/relationships" xmlns:mc="http://schemas.openxmlformats.org/markup-compatibility/2006" xmlns:mv="urn:schemas-microsoft-com:mac:vml" xmlns:p="http://schemas.openxmlformats.org/presentationml/2006/main" mc:Ignorable="mv" mc:PreserveAttributes="mv:*" type="obj" preserve="1">
+<p:sldLayout xmlns:a="http://schemas.openxmlformats.org/drawingml/2006/main" xmlns:r="http://schemas.openxmlformats.org/officeDocument/2006/relationships" xmlns:p="http://schemas.openxmlformats.org/presentationml/2006/main" type="obj" preserve="1">
   <p:cSld name="Title and Content">
     <p:spTree>
       <p:nvGrpSpPr>
@@ -2610,7 +2766,7 @@
               <a:pPr>
                 <a:defRPr/>
               </a:pPr>
-              <a:t>5/26/13</a:t>
+              <a:t>20.05.14</a:t>
             </a:fld>
             <a:endParaRPr lang="en-US"/>
           </a:p>
@@ -2684,7 +2840,7 @@
 </file>
 
 <file path=ppt/slideLayouts/slideLayout3.xml><?xml version="1.0" encoding="utf-8"?>
-<p:sldLayout xmlns:a="http://schemas.openxmlformats.org/drawingml/2006/main" xmlns:r="http://schemas.openxmlformats.org/officeDocument/2006/relationships" xmlns:mc="http://schemas.openxmlformats.org/markup-compatibility/2006" xmlns:mv="urn:schemas-microsoft-com:mac:vml" xmlns:p="http://schemas.openxmlformats.org/presentationml/2006/main" mc:Ignorable="mv" mc:PreserveAttributes="mv:*" type="secHead" preserve="1">
+<p:sldLayout xmlns:a="http://schemas.openxmlformats.org/drawingml/2006/main" xmlns:r="http://schemas.openxmlformats.org/officeDocument/2006/relationships" xmlns:p="http://schemas.openxmlformats.org/presentationml/2006/main" type="secHead" preserve="1">
   <p:cSld name="Section Header">
     <p:spTree>
       <p:nvGrpSpPr>
@@ -2878,7 +3034,7 @@
               <a:pPr>
                 <a:defRPr/>
               </a:pPr>
-              <a:t>5/26/13</a:t>
+              <a:t>20.05.14</a:t>
             </a:fld>
             <a:endParaRPr lang="en-US"/>
           </a:p>
@@ -2952,7 +3108,7 @@
 </file>
 
 <file path=ppt/slideLayouts/slideLayout4.xml><?xml version="1.0" encoding="utf-8"?>
-<p:sldLayout xmlns:a="http://schemas.openxmlformats.org/drawingml/2006/main" xmlns:r="http://schemas.openxmlformats.org/officeDocument/2006/relationships" xmlns:mc="http://schemas.openxmlformats.org/markup-compatibility/2006" xmlns:mv="urn:schemas-microsoft-com:mac:vml" xmlns:p="http://schemas.openxmlformats.org/presentationml/2006/main" mc:Ignorable="mv" mc:PreserveAttributes="mv:*" type="twoObj" preserve="1">
+<p:sldLayout xmlns:a="http://schemas.openxmlformats.org/drawingml/2006/main" xmlns:r="http://schemas.openxmlformats.org/officeDocument/2006/relationships" xmlns:p="http://schemas.openxmlformats.org/presentationml/2006/main" type="twoObj" preserve="1">
   <p:cSld name="Two Content">
     <p:spTree>
       <p:nvGrpSpPr>
@@ -3188,7 +3344,7 @@
               <a:pPr>
                 <a:defRPr/>
               </a:pPr>
-              <a:t>5/26/13</a:t>
+              <a:t>20.05.14</a:t>
             </a:fld>
             <a:endParaRPr lang="en-US"/>
           </a:p>
@@ -3262,7 +3418,7 @@
 </file>
 
 <file path=ppt/slideLayouts/slideLayout5.xml><?xml version="1.0" encoding="utf-8"?>
-<p:sldLayout xmlns:a="http://schemas.openxmlformats.org/drawingml/2006/main" xmlns:r="http://schemas.openxmlformats.org/officeDocument/2006/relationships" xmlns:mc="http://schemas.openxmlformats.org/markup-compatibility/2006" xmlns:mv="urn:schemas-microsoft-com:mac:vml" xmlns:p="http://schemas.openxmlformats.org/presentationml/2006/main" mc:Ignorable="mv" mc:PreserveAttributes="mv:*" type="twoTxTwoObj" preserve="1">
+<p:sldLayout xmlns:a="http://schemas.openxmlformats.org/drawingml/2006/main" xmlns:r="http://schemas.openxmlformats.org/officeDocument/2006/relationships" xmlns:p="http://schemas.openxmlformats.org/presentationml/2006/main" type="twoTxTwoObj" preserve="1">
   <p:cSld name="Comparison">
     <p:spTree>
       <p:nvGrpSpPr>
@@ -3632,7 +3788,7 @@
               <a:pPr>
                 <a:defRPr/>
               </a:pPr>
-              <a:t>5/26/13</a:t>
+              <a:t>20.05.14</a:t>
             </a:fld>
             <a:endParaRPr lang="en-US"/>
           </a:p>
@@ -3706,7 +3862,7 @@
 </file>
 
 <file path=ppt/slideLayouts/slideLayout6.xml><?xml version="1.0" encoding="utf-8"?>
-<p:sldLayout xmlns:a="http://schemas.openxmlformats.org/drawingml/2006/main" xmlns:r="http://schemas.openxmlformats.org/officeDocument/2006/relationships" xmlns:mc="http://schemas.openxmlformats.org/markup-compatibility/2006" xmlns:mv="urn:schemas-microsoft-com:mac:vml" xmlns:p="http://schemas.openxmlformats.org/presentationml/2006/main" mc:Ignorable="mv" mc:PreserveAttributes="mv:*" type="titleOnly" preserve="1">
+<p:sldLayout xmlns:a="http://schemas.openxmlformats.org/drawingml/2006/main" xmlns:r="http://schemas.openxmlformats.org/officeDocument/2006/relationships" xmlns:p="http://schemas.openxmlformats.org/presentationml/2006/main" type="titleOnly" preserve="1">
   <p:cSld name="Title Only">
     <p:spTree>
       <p:nvGrpSpPr>
@@ -3772,7 +3928,7 @@
               <a:pPr>
                 <a:defRPr/>
               </a:pPr>
-              <a:t>5/26/13</a:t>
+              <a:t>20.05.14</a:t>
             </a:fld>
             <a:endParaRPr lang="en-US"/>
           </a:p>
@@ -3846,7 +4002,7 @@
 </file>
 
 <file path=ppt/slideLayouts/slideLayout7.xml><?xml version="1.0" encoding="utf-8"?>
-<p:sldLayout xmlns:a="http://schemas.openxmlformats.org/drawingml/2006/main" xmlns:r="http://schemas.openxmlformats.org/officeDocument/2006/relationships" xmlns:mc="http://schemas.openxmlformats.org/markup-compatibility/2006" xmlns:mv="urn:schemas-microsoft-com:mac:vml" xmlns:p="http://schemas.openxmlformats.org/presentationml/2006/main" mc:Ignorable="mv" mc:PreserveAttributes="mv:*" type="blank" preserve="1">
+<p:sldLayout xmlns:a="http://schemas.openxmlformats.org/drawingml/2006/main" xmlns:r="http://schemas.openxmlformats.org/officeDocument/2006/relationships" xmlns:p="http://schemas.openxmlformats.org/presentationml/2006/main" type="blank" preserve="1">
   <p:cSld name="Blank">
     <p:spTree>
       <p:nvGrpSpPr>
@@ -3889,7 +4045,7 @@
               <a:pPr>
                 <a:defRPr/>
               </a:pPr>
-              <a:t>5/26/13</a:t>
+              <a:t>20.05.14</a:t>
             </a:fld>
             <a:endParaRPr lang="en-US"/>
           </a:p>
@@ -3963,7 +4119,7 @@
 </file>
 
 <file path=ppt/slideLayouts/slideLayout8.xml><?xml version="1.0" encoding="utf-8"?>
-<p:sldLayout xmlns:a="http://schemas.openxmlformats.org/drawingml/2006/main" xmlns:r="http://schemas.openxmlformats.org/officeDocument/2006/relationships" xmlns:mc="http://schemas.openxmlformats.org/markup-compatibility/2006" xmlns:mv="urn:schemas-microsoft-com:mac:vml" xmlns:p="http://schemas.openxmlformats.org/presentationml/2006/main" mc:Ignorable="mv" mc:PreserveAttributes="mv:*" type="objTx" preserve="1">
+<p:sldLayout xmlns:a="http://schemas.openxmlformats.org/drawingml/2006/main" xmlns:r="http://schemas.openxmlformats.org/officeDocument/2006/relationships" xmlns:p="http://schemas.openxmlformats.org/presentationml/2006/main" type="objTx" preserve="1">
   <p:cSld name="Content with Caption">
     <p:spTree>
       <p:nvGrpSpPr>
@@ -4188,7 +4344,7 @@
               <a:pPr>
                 <a:defRPr/>
               </a:pPr>
-              <a:t>5/26/13</a:t>
+              <a:t>20.05.14</a:t>
             </a:fld>
             <a:endParaRPr lang="en-US"/>
           </a:p>
@@ -4262,7 +4418,7 @@
 </file>
 
 <file path=ppt/slideLayouts/slideLayout9.xml><?xml version="1.0" encoding="utf-8"?>
-<p:sldLayout xmlns:a="http://schemas.openxmlformats.org/drawingml/2006/main" xmlns:r="http://schemas.openxmlformats.org/officeDocument/2006/relationships" xmlns:mc="http://schemas.openxmlformats.org/markup-compatibility/2006" xmlns:mv="urn:schemas-microsoft-com:mac:vml" xmlns:p="http://schemas.openxmlformats.org/presentationml/2006/main" mc:Ignorable="mv" mc:PreserveAttributes="mv:*" type="picTx" preserve="1">
+<p:sldLayout xmlns:a="http://schemas.openxmlformats.org/drawingml/2006/main" xmlns:r="http://schemas.openxmlformats.org/officeDocument/2006/relationships" xmlns:p="http://schemas.openxmlformats.org/presentationml/2006/main" type="picTx" preserve="1">
   <p:cSld name="Picture with Caption">
     <p:spTree>
       <p:nvGrpSpPr>
@@ -4466,7 +4622,7 @@
               <a:pPr>
                 <a:defRPr/>
               </a:pPr>
-              <a:t>5/26/13</a:t>
+              <a:t>20.05.14</a:t>
             </a:fld>
             <a:endParaRPr lang="en-US"/>
           </a:p>
@@ -4540,7 +4696,7 @@
 </file>
 
 <file path=ppt/slideMasters/slideMaster1.xml><?xml version="1.0" encoding="utf-8"?>
-<p:sldMaster xmlns:a="http://schemas.openxmlformats.org/drawingml/2006/main" xmlns:r="http://schemas.openxmlformats.org/officeDocument/2006/relationships" xmlns:mc="http://schemas.openxmlformats.org/markup-compatibility/2006" xmlns:mv="urn:schemas-microsoft-com:mac:vml" xmlns:p="http://schemas.openxmlformats.org/presentationml/2006/main" mc:Ignorable="mv" mc:PreserveAttributes="mv:*">
+<p:sldMaster xmlns:a="http://schemas.openxmlformats.org/drawingml/2006/main" xmlns:r="http://schemas.openxmlformats.org/officeDocument/2006/relationships" xmlns:p="http://schemas.openxmlformats.org/presentationml/2006/main">
   <p:cSld>
     <p:bg>
       <p:bgRef idx="1001">
@@ -4723,7 +4879,7 @@
               <a:pPr>
                 <a:defRPr/>
               </a:pPr>
-              <a:t>5/26/13</a:t>
+              <a:t>20.05.14</a:t>
             </a:fld>
             <a:endParaRPr lang="en-US"/>
           </a:p>
@@ -5249,7 +5405,7 @@
 </file>
 
 <file path=ppt/slides/slide1.xml><?xml version="1.0" encoding="utf-8"?>
-<p:sld xmlns:a="http://schemas.openxmlformats.org/drawingml/2006/main" xmlns:r="http://schemas.openxmlformats.org/officeDocument/2006/relationships" xmlns:mc="http://schemas.openxmlformats.org/markup-compatibility/2006" xmlns:mv="urn:schemas-microsoft-com:mac:vml" xmlns:p="http://schemas.openxmlformats.org/presentationml/2006/main" mc:Ignorable="mv" mc:PreserveAttributes="mv:*">
+<p:sld xmlns:a="http://schemas.openxmlformats.org/drawingml/2006/main" xmlns:r="http://schemas.openxmlformats.org/officeDocument/2006/relationships" xmlns:p="http://schemas.openxmlformats.org/presentationml/2006/main">
   <p:cSld>
     <p:spTree>
       <p:nvGrpSpPr>
@@ -5279,9 +5435,59 @@
         </p:xfrm>
         <a:graphic>
           <a:graphicData uri="http://schemas.openxmlformats.org/presentationml/2006/ole">
-            <p:oleObj spid="_x0000_s40962" name="Document" r:id="rId3" imgW="6281928" imgH="7248144" progId="Word.Document.8">
-              <p:embed/>
-            </p:oleObj>
+            <mc:AlternateContent xmlns:mc="http://schemas.openxmlformats.org/markup-compatibility/2006">
+              <mc:Choice xmlns:v="urn:schemas-microsoft-com:vml" Requires="v">
+                <p:oleObj spid="_x0000_s40974" name="Document" r:id="rId3" imgW="6281928" imgH="7248144" progId="Word.Document.8">
+                  <p:embed/>
+                </p:oleObj>
+              </mc:Choice>
+              <mc:Fallback>
+                <p:oleObj name="Document" r:id="rId3" imgW="6281928" imgH="7248144" progId="Word.Document.8">
+                  <p:embed/>
+                  <p:pic>
+                    <p:nvPicPr>
+                      <p:cNvPr id="0" name="Picture 2"/>
+                      <p:cNvPicPr>
+                        <a:picLocks noChangeAspect="1" noChangeArrowheads="1"/>
+                      </p:cNvPicPr>
+                      <p:nvPr/>
+                    </p:nvPicPr>
+                    <p:blipFill>
+                      <a:blip r:embed="rId4">
+                        <a:extLst>
+                          <a:ext uri="{28A0092B-C50C-407E-A947-70E740481C1C}">
+                            <a14:useLocalDpi xmlns:a14="http://schemas.microsoft.com/office/drawing/2010/main" val="0"/>
+                          </a:ext>
+                        </a:extLst>
+                      </a:blip>
+                      <a:srcRect/>
+                      <a:stretch>
+                        <a:fillRect/>
+                      </a:stretch>
+                    </p:blipFill>
+                    <p:spPr bwMode="auto">
+                      <a:xfrm>
+                        <a:off x="184150" y="212725"/>
+                        <a:ext cx="5638800" cy="6505575"/>
+                      </a:xfrm>
+                      <a:prstGeom prst="rect">
+                        <a:avLst/>
+                      </a:prstGeom>
+                      <a:noFill/>
+                      <a:extLst>
+                        <a:ext uri="{909E8E84-426E-40dd-AFC4-6F175D3DCCD1}">
+                          <a14:hiddenFill xmlns:a14="http://schemas.microsoft.com/office/drawing/2010/main">
+                            <a:solidFill>
+                              <a:srgbClr val="FFFFFF"/>
+                            </a:solidFill>
+                          </a14:hiddenFill>
+                        </a:ext>
+                      </a:extLst>
+                    </p:spPr>
+                  </p:pic>
+                </p:oleObj>
+              </mc:Fallback>
+            </mc:AlternateContent>
           </a:graphicData>
         </a:graphic>
       </p:graphicFrame>
@@ -5294,7 +5500,7 @@
 </file>
 
 <file path=ppt/slides/slide10.xml><?xml version="1.0" encoding="utf-8"?>
-<p:sld xmlns:a="http://schemas.openxmlformats.org/drawingml/2006/main" xmlns:r="http://schemas.openxmlformats.org/officeDocument/2006/relationships" xmlns:mc="http://schemas.openxmlformats.org/markup-compatibility/2006" xmlns:mv="urn:schemas-microsoft-com:mac:vml" xmlns:p="http://schemas.openxmlformats.org/presentationml/2006/main" mc:Ignorable="mv" mc:PreserveAttributes="mv:*">
+<p:sld xmlns:a="http://schemas.openxmlformats.org/drawingml/2006/main" xmlns:r="http://schemas.openxmlformats.org/officeDocument/2006/relationships" xmlns:p="http://schemas.openxmlformats.org/presentationml/2006/main">
   <p:cSld>
     <p:spTree>
       <p:nvGrpSpPr>
@@ -5312,6 +5518,285 @@
       </p:grpSpPr>
       <p:sp>
         <p:nvSpPr>
+          <p:cNvPr id="21505" name="TextBox 4"/>
+          <p:cNvSpPr txBox="1">
+            <a:spLocks/>
+          </p:cNvSpPr>
+          <p:nvPr/>
+        </p:nvSpPr>
+        <p:spPr bwMode="auto">
+          <a:xfrm>
+            <a:off x="568325" y="635000"/>
+            <a:ext cx="8321675" cy="5078413"/>
+          </a:xfrm>
+          <a:prstGeom prst="rect">
+            <a:avLst/>
+          </a:prstGeom>
+          <a:noFill/>
+          <a:ln w="9525">
+            <a:noFill/>
+            <a:miter lim="800000"/>
+            <a:headEnd/>
+            <a:tailEnd/>
+          </a:ln>
+        </p:spPr>
+        <p:txBody>
+          <a:bodyPr>
+            <a:prstTxWarp prst="textNoShape">
+              <a:avLst/>
+            </a:prstTxWarp>
+            <a:spAutoFit/>
+          </a:bodyPr>
+          <a:lstStyle/>
+          <a:p>
+            <a:r>
+              <a:rPr lang="en-US" sz="3600" b="1" dirty="0">
+                <a:latin typeface="Courier" pitchFamily="-72" charset="0"/>
+                <a:ea typeface="Courier" pitchFamily="-72" charset="0"/>
+                <a:cs typeface="Courier" pitchFamily="-72" charset="0"/>
+              </a:rPr>
+              <a:t>while </a:t>
+            </a:r>
+            <a:r>
+              <a:rPr lang="en-US" sz="3600" dirty="0">
+                <a:latin typeface="Courier" pitchFamily="-72" charset="0"/>
+                <a:ea typeface="Courier" pitchFamily="-72" charset="0"/>
+                <a:cs typeface="Courier" pitchFamily="-72" charset="0"/>
+              </a:rPr>
+              <a:t>condition</a:t>
+            </a:r>
+          </a:p>
+          <a:p>
+            <a:r>
+              <a:rPr lang="en-US" sz="3600" b="1" dirty="0">
+                <a:latin typeface="Courier" pitchFamily="-72" charset="0"/>
+                <a:ea typeface="Courier" pitchFamily="-72" charset="0"/>
+                <a:cs typeface="Courier" pitchFamily="-72" charset="0"/>
+              </a:rPr>
+              <a:t>do</a:t>
+            </a:r>
+          </a:p>
+          <a:p>
+            <a:r>
+              <a:rPr lang="en-US" sz="3600" b="1" dirty="0">
+                <a:latin typeface="Courier" pitchFamily="-72" charset="0"/>
+                <a:ea typeface="Courier" pitchFamily="-72" charset="0"/>
+                <a:cs typeface="Courier" pitchFamily="-72" charset="0"/>
+              </a:rPr>
+              <a:t>  </a:t>
+            </a:r>
+            <a:r>
+              <a:rPr lang="en-US" sz="3600" dirty="0">
+                <a:latin typeface="Courier" pitchFamily="-72" charset="0"/>
+                <a:ea typeface="Courier" pitchFamily="-72" charset="0"/>
+                <a:cs typeface="Courier" pitchFamily="-72" charset="0"/>
+              </a:rPr>
+              <a:t>statements</a:t>
+            </a:r>
+          </a:p>
+          <a:p>
+            <a:r>
+              <a:rPr lang="en-US" sz="3600" b="1" dirty="0" smtClean="0">
+                <a:latin typeface="Courier" pitchFamily="-72" charset="0"/>
+                <a:ea typeface="Courier" pitchFamily="-72" charset="0"/>
+                <a:cs typeface="Courier" pitchFamily="-72" charset="0"/>
+              </a:rPr>
+              <a:t>done</a:t>
+            </a:r>
+            <a:endParaRPr lang="en-US" sz="3600" b="1" dirty="0">
+              <a:latin typeface="Courier" pitchFamily="-72" charset="0"/>
+              <a:ea typeface="Courier" pitchFamily="-72" charset="0"/>
+              <a:cs typeface="Courier" pitchFamily="-72" charset="0"/>
+            </a:endParaRPr>
+          </a:p>
+          <a:p>
+            <a:endParaRPr lang="en-US" sz="3600" b="1" dirty="0">
+              <a:latin typeface="Courier" pitchFamily="-72" charset="0"/>
+              <a:ea typeface="Courier" pitchFamily="-72" charset="0"/>
+              <a:cs typeface="Courier" pitchFamily="-72" charset="0"/>
+            </a:endParaRPr>
+          </a:p>
+          <a:p>
+            <a:r>
+              <a:rPr lang="en-US" sz="3600" b="1" dirty="0">
+                <a:latin typeface="Courier" pitchFamily="-72" charset="0"/>
+                <a:ea typeface="Courier" pitchFamily="-72" charset="0"/>
+                <a:cs typeface="Courier" pitchFamily="-72" charset="0"/>
+              </a:rPr>
+              <a:t>until </a:t>
+            </a:r>
+            <a:r>
+              <a:rPr lang="en-US" sz="3600" dirty="0">
+                <a:latin typeface="Courier" pitchFamily="-72" charset="0"/>
+                <a:ea typeface="Courier" pitchFamily="-72" charset="0"/>
+                <a:cs typeface="Courier" pitchFamily="-72" charset="0"/>
+              </a:rPr>
+              <a:t>condition</a:t>
+            </a:r>
+          </a:p>
+          <a:p>
+            <a:r>
+              <a:rPr lang="en-US" sz="3600" b="1" dirty="0">
+                <a:latin typeface="Courier" pitchFamily="-72" charset="0"/>
+                <a:ea typeface="Courier" pitchFamily="-72" charset="0"/>
+                <a:cs typeface="Courier" pitchFamily="-72" charset="0"/>
+              </a:rPr>
+              <a:t>do</a:t>
+            </a:r>
+          </a:p>
+          <a:p>
+            <a:r>
+              <a:rPr lang="en-US" sz="3600" b="1" dirty="0">
+                <a:latin typeface="Courier" pitchFamily="-72" charset="0"/>
+                <a:ea typeface="Courier" pitchFamily="-72" charset="0"/>
+                <a:cs typeface="Courier" pitchFamily="-72" charset="0"/>
+              </a:rPr>
+              <a:t>  </a:t>
+            </a:r>
+            <a:r>
+              <a:rPr lang="en-US" sz="3600" dirty="0">
+                <a:latin typeface="Courier" pitchFamily="-72" charset="0"/>
+                <a:ea typeface="Courier" pitchFamily="-72" charset="0"/>
+                <a:cs typeface="Courier" pitchFamily="-72" charset="0"/>
+              </a:rPr>
+              <a:t>statements</a:t>
+            </a:r>
+          </a:p>
+          <a:p>
+            <a:r>
+              <a:rPr lang="en-US" sz="3600" b="1" dirty="0">
+                <a:latin typeface="Courier" pitchFamily="-72" charset="0"/>
+                <a:ea typeface="Courier" pitchFamily="-72" charset="0"/>
+                <a:cs typeface="Courier" pitchFamily="-72" charset="0"/>
+              </a:rPr>
+              <a:t>done</a:t>
+            </a:r>
+          </a:p>
+        </p:txBody>
+      </p:sp>
+    </p:spTree>
+  </p:cSld>
+  <p:clrMapOvr>
+    <a:masterClrMapping/>
+  </p:clrMapOvr>
+</p:sld>
+</file>
+
+<file path=ppt/slides/slide11.xml><?xml version="1.0" encoding="utf-8"?>
+<p:sld xmlns:a="http://schemas.openxmlformats.org/drawingml/2006/main" xmlns:r="http://schemas.openxmlformats.org/officeDocument/2006/relationships" xmlns:p="http://schemas.openxmlformats.org/presentationml/2006/main">
+  <p:cSld>
+    <p:spTree>
+      <p:nvGrpSpPr>
+        <p:cNvPr id="1" name=""/>
+        <p:cNvGrpSpPr/>
+        <p:nvPr/>
+      </p:nvGrpSpPr>
+      <p:grpSpPr>
+        <a:xfrm>
+          <a:off x="0" y="0"/>
+          <a:ext cx="0" cy="0"/>
+          <a:chOff x="0" y="0"/>
+          <a:chExt cx="0" cy="0"/>
+        </a:xfrm>
+      </p:grpSpPr>
+      <p:sp>
+        <p:nvSpPr>
+          <p:cNvPr id="3" name="TextBox 2"/>
+          <p:cNvSpPr txBox="1"/>
+          <p:nvPr/>
+        </p:nvSpPr>
+        <p:spPr>
+          <a:xfrm>
+            <a:off x="1535723" y="169349"/>
+            <a:ext cx="5611933" cy="646331"/>
+          </a:xfrm>
+          <a:prstGeom prst="rect">
+            <a:avLst/>
+          </a:prstGeom>
+          <a:noFill/>
+        </p:spPr>
+        <p:txBody>
+          <a:bodyPr wrap="none">
+            <a:spAutoFit/>
+          </a:bodyPr>
+          <a:lstStyle/>
+          <a:p>
+            <a:pPr fontAlgn="auto">
+              <a:spcBef>
+                <a:spcPts val="0"/>
+              </a:spcBef>
+              <a:spcAft>
+                <a:spcPts val="0"/>
+              </a:spcAft>
+              <a:defRPr/>
+            </a:pPr>
+            <a:r>
+              <a:rPr lang="en-US" sz="3600" b="1" spc="600" dirty="0" smtClean="0">
+                <a:latin typeface="+mn-lt"/>
+                <a:ea typeface="+mn-ea"/>
+                <a:cs typeface="+mn-cs"/>
+              </a:rPr>
+              <a:t>Manual Loop Control</a:t>
+            </a:r>
+            <a:endParaRPr lang="en-US" sz="3600" b="1" dirty="0">
+              <a:latin typeface="+mn-lt"/>
+              <a:ea typeface="+mn-ea"/>
+              <a:cs typeface="+mn-cs"/>
+            </a:endParaRPr>
+          </a:p>
+        </p:txBody>
+      </p:sp>
+      <p:pic>
+        <p:nvPicPr>
+          <p:cNvPr id="4" name="Picture 3"/>
+          <p:cNvPicPr>
+            <a:picLocks noChangeAspect="1"/>
+          </p:cNvPicPr>
+          <p:nvPr/>
+        </p:nvPicPr>
+        <p:blipFill>
+          <a:blip r:embed="rId3"/>
+          <a:stretch>
+            <a:fillRect/>
+          </a:stretch>
+        </p:blipFill>
+        <p:spPr>
+          <a:xfrm>
+            <a:off x="1818053" y="1296377"/>
+            <a:ext cx="4889500" cy="4343400"/>
+          </a:xfrm>
+          <a:prstGeom prst="rect">
+            <a:avLst/>
+          </a:prstGeom>
+        </p:spPr>
+      </p:pic>
+    </p:spTree>
+  </p:cSld>
+  <p:clrMapOvr>
+    <a:masterClrMapping/>
+  </p:clrMapOvr>
+</p:sld>
+</file>
+
+<file path=ppt/slides/slide12.xml><?xml version="1.0" encoding="utf-8"?>
+<p:sld xmlns:a="http://schemas.openxmlformats.org/drawingml/2006/main" xmlns:r="http://schemas.openxmlformats.org/officeDocument/2006/relationships" xmlns:p="http://schemas.openxmlformats.org/presentationml/2006/main">
+  <p:cSld>
+    <p:spTree>
+      <p:nvGrpSpPr>
+        <p:cNvPr id="1" name=""/>
+        <p:cNvGrpSpPr/>
+        <p:nvPr/>
+      </p:nvGrpSpPr>
+      <p:grpSpPr>
+        <a:xfrm>
+          <a:off x="0" y="0"/>
+          <a:ext cx="0" cy="0"/>
+          <a:chOff x="0" y="0"/>
+          <a:chExt cx="0" cy="0"/>
+        </a:xfrm>
+      </p:grpSpPr>
+      <p:sp>
+        <p:nvSpPr>
           <p:cNvPr id="3" name="TextBox 2"/>
           <p:cNvSpPr txBox="1"/>
           <p:nvPr/>
@@ -5357,11 +5842,6 @@
               </a:rPr>
               <a:t>Variables</a:t>
             </a:r>
-            <a:endParaRPr lang="en-US" sz="3600" b="1" dirty="0">
-              <a:latin typeface="+mn-lt"/>
-              <a:ea typeface="+mn-ea"/>
-              <a:cs typeface="+mn-cs"/>
-            </a:endParaRPr>
           </a:p>
         </p:txBody>
       </p:sp>
@@ -5748,15 +6228,15 @@
               </a:rPr>
               <a:t> $MYDIR </a:t>
             </a:r>
-            <a:endParaRPr lang="en-US" dirty="0">
-              <a:latin typeface="Courier"/>
-              <a:ea typeface="+mn-ea"/>
-              <a:cs typeface="Courier"/>
-            </a:endParaRPr>
           </a:p>
         </p:txBody>
       </p:sp>
     </p:spTree>
+    <p:extLst>
+      <p:ext uri="{BB962C8B-B14F-4D97-AF65-F5344CB8AC3E}">
+        <p14:creationId xmlns:p14="http://schemas.microsoft.com/office/powerpoint/2010/main" val="3365781503"/>
+      </p:ext>
+    </p:extLst>
   </p:cSld>
   <p:clrMapOvr>
     <a:masterClrMapping/>
@@ -5764,8 +6244,8 @@
 </p:sld>
 </file>
 
-<file path=ppt/slides/slide11.xml><?xml version="1.0" encoding="utf-8"?>
-<p:sld xmlns:a="http://schemas.openxmlformats.org/drawingml/2006/main" xmlns:r="http://schemas.openxmlformats.org/officeDocument/2006/relationships" xmlns:mc="http://schemas.openxmlformats.org/markup-compatibility/2006" xmlns:mv="urn:schemas-microsoft-com:mac:vml" xmlns:p="http://schemas.openxmlformats.org/presentationml/2006/main" mc:Ignorable="mv" mc:PreserveAttributes="mv:*">
+<file path=ppt/slides/slide13.xml><?xml version="1.0" encoding="utf-8"?>
+<p:sld xmlns:a="http://schemas.openxmlformats.org/drawingml/2006/main" xmlns:r="http://schemas.openxmlformats.org/officeDocument/2006/relationships" xmlns:p="http://schemas.openxmlformats.org/presentationml/2006/main">
   <p:cSld>
     <p:spTree>
       <p:nvGrpSpPr>
@@ -5828,11 +6308,6 @@
               </a:rPr>
               <a:t>Settings File</a:t>
             </a:r>
-            <a:endParaRPr lang="en-US" sz="3600" b="1" dirty="0">
-              <a:latin typeface="+mn-lt"/>
-              <a:ea typeface="+mn-ea"/>
-              <a:cs typeface="+mn-cs"/>
-            </a:endParaRPr>
           </a:p>
         </p:txBody>
       </p:sp>
@@ -6138,11 +6613,6 @@
               </a:rPr>
               <a:t> $MYDIR </a:t>
             </a:r>
-            <a:endParaRPr lang="en-US" dirty="0">
-              <a:latin typeface="Courier"/>
-              <a:ea typeface="+mn-ea"/>
-              <a:cs typeface="Courier"/>
-            </a:endParaRPr>
           </a:p>
         </p:txBody>
       </p:sp>
@@ -6154,8 +6624,8 @@
 </p:sld>
 </file>
 
-<file path=ppt/slides/slide12.xml><?xml version="1.0" encoding="utf-8"?>
-<p:sld xmlns:a="http://schemas.openxmlformats.org/drawingml/2006/main" xmlns:r="http://schemas.openxmlformats.org/officeDocument/2006/relationships" xmlns:mc="http://schemas.openxmlformats.org/markup-compatibility/2006" xmlns:mv="urn:schemas-microsoft-com:mac:vml" xmlns:p="http://schemas.openxmlformats.org/presentationml/2006/main" mc:Ignorable="mv" mc:PreserveAttributes="mv:*">
+<file path=ppt/slides/slide14.xml><?xml version="1.0" encoding="utf-8"?>
+<p:sld xmlns:a="http://schemas.openxmlformats.org/drawingml/2006/main" xmlns:r="http://schemas.openxmlformats.org/officeDocument/2006/relationships" xmlns:p="http://schemas.openxmlformats.org/presentationml/2006/main">
   <p:cSld>
     <p:spTree>
       <p:nvGrpSpPr>
@@ -6237,11 +6707,6 @@
               </a:rPr>
               <a:t> Parameters</a:t>
             </a:r>
-            <a:endParaRPr lang="en-US" sz="3600" b="1" dirty="0">
-              <a:latin typeface="+mn-lt"/>
-              <a:ea typeface="+mn-ea"/>
-              <a:cs typeface="+mn-cs"/>
-            </a:endParaRPr>
           </a:p>
         </p:txBody>
       </p:sp>
@@ -6285,8 +6750,8 @@
 </p:sld>
 </file>
 
-<file path=ppt/slides/slide13.xml><?xml version="1.0" encoding="utf-8"?>
-<p:sld xmlns:a="http://schemas.openxmlformats.org/drawingml/2006/main" xmlns:r="http://schemas.openxmlformats.org/officeDocument/2006/relationships" xmlns:mc="http://schemas.openxmlformats.org/markup-compatibility/2006" xmlns:mv="urn:schemas-microsoft-com:mac:vml" xmlns:p="http://schemas.openxmlformats.org/presentationml/2006/main" mc:Ignorable="mv" mc:PreserveAttributes="mv:*">
+<file path=ppt/slides/slide15.xml><?xml version="1.0" encoding="utf-8"?>
+<p:sld xmlns:a="http://schemas.openxmlformats.org/drawingml/2006/main" xmlns:r="http://schemas.openxmlformats.org/officeDocument/2006/relationships" xmlns:p="http://schemas.openxmlformats.org/presentationml/2006/main">
   <p:cSld>
     <p:spTree>
       <p:nvGrpSpPr>
@@ -6327,19 +6792,45 @@
           </a:bodyPr>
           <a:lstStyle/>
           <a:p>
-            <a:r>
-              <a:rPr lang="en-US" sz="3600" b="1">
+            <a:pPr algn="ctr"/>
+            <a:r>
+              <a:rPr lang="en-US" sz="3600" b="1" dirty="0">
                 <a:latin typeface="Calibri" pitchFamily="-72" charset="0"/>
               </a:rPr>
               <a:t>Script Flexibility:</a:t>
             </a:r>
           </a:p>
           <a:p>
-            <a:r>
-              <a:rPr lang="en-US" sz="3600" b="1">
+            <a:pPr algn="ctr"/>
+            <a:r>
+              <a:rPr lang="en-US" sz="3600" b="1" dirty="0">
                 <a:latin typeface="Calibri" pitchFamily="-72" charset="0"/>
               </a:rPr>
-              <a:t>Walking throug the Commandline Parameters</a:t>
+              <a:t>Walking </a:t>
+            </a:r>
+            <a:r>
+              <a:rPr lang="en-US" sz="3600" b="1" dirty="0" smtClean="0">
+                <a:latin typeface="Calibri" pitchFamily="-72" charset="0"/>
+              </a:rPr>
+              <a:t>through </a:t>
+            </a:r>
+            <a:r>
+              <a:rPr lang="en-US" sz="3600" b="1" dirty="0">
+                <a:latin typeface="Calibri" pitchFamily="-72" charset="0"/>
+              </a:rPr>
+              <a:t>the </a:t>
+            </a:r>
+            <a:r>
+              <a:rPr lang="en-US" sz="3600" b="1" dirty="0" err="1">
+                <a:latin typeface="Calibri" pitchFamily="-72" charset="0"/>
+              </a:rPr>
+              <a:t>Commandline</a:t>
+            </a:r>
+            <a:r>
+              <a:rPr lang="en-US" sz="3600" b="1" dirty="0">
+                <a:latin typeface="Calibri" pitchFamily="-72" charset="0"/>
+              </a:rPr>
+              <a:t> Parameters</a:t>
             </a:r>
           </a:p>
         </p:txBody>
@@ -6358,9 +6849,59 @@
         </p:xfrm>
         <a:graphic>
           <a:graphicData uri="http://schemas.openxmlformats.org/presentationml/2006/ole">
-            <p:oleObj spid="_x0000_s38916" name="Document" r:id="rId4" imgW="6086856" imgH="1700784" progId="Word.Document.8">
-              <p:embed/>
-            </p:oleObj>
+            <mc:AlternateContent xmlns:mc="http://schemas.openxmlformats.org/markup-compatibility/2006">
+              <mc:Choice xmlns:v="urn:schemas-microsoft-com:vml" Requires="v">
+                <p:oleObj spid="_x0000_s38928" name="Document" r:id="rId4" imgW="6086856" imgH="1700784" progId="Word.Document.8">
+                  <p:embed/>
+                </p:oleObj>
+              </mc:Choice>
+              <mc:Fallback>
+                <p:oleObj name="Document" r:id="rId4" imgW="6086856" imgH="1700784" progId="Word.Document.8">
+                  <p:embed/>
+                  <p:pic>
+                    <p:nvPicPr>
+                      <p:cNvPr id="0" name="Picture 4"/>
+                      <p:cNvPicPr>
+                        <a:picLocks noChangeAspect="1" noChangeArrowheads="1"/>
+                      </p:cNvPicPr>
+                      <p:nvPr/>
+                    </p:nvPicPr>
+                    <p:blipFill>
+                      <a:blip r:embed="rId5">
+                        <a:extLst>
+                          <a:ext uri="{28A0092B-C50C-407E-A947-70E740481C1C}">
+                            <a14:useLocalDpi xmlns:a14="http://schemas.microsoft.com/office/drawing/2010/main" val="0"/>
+                          </a:ext>
+                        </a:extLst>
+                      </a:blip>
+                      <a:srcRect/>
+                      <a:stretch>
+                        <a:fillRect/>
+                      </a:stretch>
+                    </p:blipFill>
+                    <p:spPr bwMode="auto">
+                      <a:xfrm>
+                        <a:off x="482600" y="2874963"/>
+                        <a:ext cx="8224838" cy="2297112"/>
+                      </a:xfrm>
+                      <a:prstGeom prst="rect">
+                        <a:avLst/>
+                      </a:prstGeom>
+                      <a:noFill/>
+                      <a:extLst>
+                        <a:ext uri="{909E8E84-426E-40dd-AFC4-6F175D3DCCD1}">
+                          <a14:hiddenFill xmlns:a14="http://schemas.microsoft.com/office/drawing/2010/main">
+                            <a:solidFill>
+                              <a:srgbClr val="FFFFFF"/>
+                            </a:solidFill>
+                          </a14:hiddenFill>
+                        </a:ext>
+                      </a:extLst>
+                    </p:spPr>
+                  </p:pic>
+                </p:oleObj>
+              </mc:Fallback>
+            </mc:AlternateContent>
           </a:graphicData>
         </a:graphic>
       </p:graphicFrame>
@@ -6372,8 +6913,8 @@
 </p:sld>
 </file>
 
-<file path=ppt/slides/slide14.xml><?xml version="1.0" encoding="utf-8"?>
-<p:sld xmlns:a="http://schemas.openxmlformats.org/drawingml/2006/main" xmlns:r="http://schemas.openxmlformats.org/officeDocument/2006/relationships" xmlns:mc="http://schemas.openxmlformats.org/markup-compatibility/2006" xmlns:mv="urn:schemas-microsoft-com:mac:vml" xmlns:p="http://schemas.openxmlformats.org/presentationml/2006/main" mc:Ignorable="mv" mc:PreserveAttributes="mv:*">
+<file path=ppt/slides/slide16.xml><?xml version="1.0" encoding="utf-8"?>
+<p:sld xmlns:a="http://schemas.openxmlformats.org/drawingml/2006/main" xmlns:r="http://schemas.openxmlformats.org/officeDocument/2006/relationships" xmlns:p="http://schemas.openxmlformats.org/presentationml/2006/main">
   <p:cSld>
     <p:spTree>
       <p:nvGrpSpPr>
@@ -6447,11 +6988,6 @@
               </a:rPr>
               <a:t>Applying the case statement</a:t>
             </a:r>
-            <a:endParaRPr lang="en-US" sz="3600" b="1" dirty="0">
-              <a:latin typeface="+mn-lt"/>
-              <a:ea typeface="+mn-ea"/>
-              <a:cs typeface="+mn-cs"/>
-            </a:endParaRPr>
           </a:p>
         </p:txBody>
       </p:sp>
@@ -6979,8 +7515,8 @@
 </p:sld>
 </file>
 
-<file path=ppt/slides/slide15.xml><?xml version="1.0" encoding="utf-8"?>
-<p:sld xmlns:a="http://schemas.openxmlformats.org/drawingml/2006/main" xmlns:r="http://schemas.openxmlformats.org/officeDocument/2006/relationships" xmlns:mc="http://schemas.openxmlformats.org/markup-compatibility/2006" xmlns:mv="urn:schemas-microsoft-com:mac:vml" xmlns:p="http://schemas.openxmlformats.org/presentationml/2006/main" mc:Ignorable="mv" mc:PreserveAttributes="mv:*">
+<file path=ppt/slides/slide17.xml><?xml version="1.0" encoding="utf-8"?>
+<p:sld xmlns:a="http://schemas.openxmlformats.org/drawingml/2006/main" xmlns:r="http://schemas.openxmlformats.org/officeDocument/2006/relationships" xmlns:p="http://schemas.openxmlformats.org/presentationml/2006/main">
   <p:cSld>
     <p:spTree>
       <p:nvGrpSpPr>
@@ -7018,7 +7554,7 @@
           </a:bodyPr>
           <a:lstStyle/>
           <a:p>
-            <a:pPr fontAlgn="auto">
+            <a:pPr algn="ctr" fontAlgn="auto">
               <a:spcBef>
                 <a:spcPts val="0"/>
               </a:spcBef>
@@ -7037,7 +7573,7 @@
             </a:r>
           </a:p>
           <a:p>
-            <a:pPr fontAlgn="auto">
+            <a:pPr algn="ctr" fontAlgn="auto">
               <a:spcBef>
                 <a:spcPts val="0"/>
               </a:spcBef>
@@ -7070,11 +7606,6 @@
               </a:rPr>
               <a:t> parameters</a:t>
             </a:r>
-            <a:endParaRPr lang="en-US" sz="3600" b="1" dirty="0">
-              <a:latin typeface="+mn-lt"/>
-              <a:ea typeface="+mn-ea"/>
-              <a:cs typeface="+mn-cs"/>
-            </a:endParaRPr>
           </a:p>
         </p:txBody>
       </p:sp>
@@ -7153,8 +7684,8 @@
 </p:sld>
 </file>
 
-<file path=ppt/slides/slide16.xml><?xml version="1.0" encoding="utf-8"?>
-<p:sld xmlns:a="http://schemas.openxmlformats.org/drawingml/2006/main" xmlns:r="http://schemas.openxmlformats.org/officeDocument/2006/relationships" xmlns:mc="http://schemas.openxmlformats.org/markup-compatibility/2006" xmlns:mv="urn:schemas-microsoft-com:mac:vml" xmlns:p="http://schemas.openxmlformats.org/presentationml/2006/main" mc:Ignorable="mv" mc:PreserveAttributes="mv:*">
+<file path=ppt/slides/slide18.xml><?xml version="1.0" encoding="utf-8"?>
+<p:sld xmlns:a="http://schemas.openxmlformats.org/drawingml/2006/main" xmlns:r="http://schemas.openxmlformats.org/officeDocument/2006/relationships" xmlns:p="http://schemas.openxmlformats.org/presentationml/2006/main">
   <p:cSld>
     <p:spTree>
       <p:nvGrpSpPr>
@@ -7228,11 +7759,6 @@
               </a:rPr>
               <a:t>The Exit Status</a:t>
             </a:r>
-            <a:endParaRPr lang="en-US" sz="3600" b="1" dirty="0">
-              <a:latin typeface="+mn-lt"/>
-              <a:ea typeface="+mn-ea"/>
-              <a:cs typeface="+mn-cs"/>
-            </a:endParaRPr>
           </a:p>
         </p:txBody>
       </p:sp>
@@ -7247,7 +7773,7 @@
         <p:spPr bwMode="auto">
           <a:xfrm>
             <a:off x="422275" y="2001838"/>
-            <a:ext cx="7878763" cy="2308225"/>
+            <a:ext cx="7878763" cy="2677656"/>
           </a:xfrm>
           <a:prstGeom prst="rect">
             <a:avLst/>
@@ -7270,45 +7796,67 @@
           <a:lstStyle/>
           <a:p>
             <a:r>
-              <a:rPr lang="en-US" sz="2400">
+              <a:rPr lang="en-US" sz="2400" dirty="0">
                 <a:latin typeface="Calibri" pitchFamily="-72" charset="0"/>
               </a:rPr>
               <a:t>There is </a:t>
             </a:r>
             <a:r>
-              <a:rPr lang="en-US" sz="2400" b="1">
+              <a:rPr lang="en-US" sz="2400" b="1" dirty="0">
                 <a:latin typeface="Calibri" pitchFamily="-72" charset="0"/>
               </a:rPr>
               <a:t>always </a:t>
             </a:r>
             <a:r>
-              <a:rPr lang="en-US" sz="2400">
+              <a:rPr lang="en-US" sz="2400" dirty="0">
                 <a:latin typeface="Calibri" pitchFamily="-72" charset="0"/>
               </a:rPr>
               <a:t>an exit status: The exit status of the last command run in the script</a:t>
             </a:r>
           </a:p>
           <a:p>
-            <a:endParaRPr lang="en-US" sz="2400">
+            <a:endParaRPr lang="en-US" sz="2400" dirty="0">
               <a:latin typeface="Calibri" pitchFamily="-72" charset="0"/>
             </a:endParaRPr>
           </a:p>
           <a:p>
             <a:r>
-              <a:rPr lang="en-US" sz="2400">
+              <a:rPr lang="en-US" sz="2400" dirty="0">
                 <a:latin typeface="Calibri" pitchFamily="-72" charset="0"/>
               </a:rPr>
-              <a:t>The exit status of the last run command is available in $?</a:t>
-            </a:r>
-          </a:p>
-          <a:p>
-            <a:endParaRPr lang="en-US" sz="2400">
+              <a:t>The exit status of the last run command is available in </a:t>
+            </a:r>
+            <a:r>
+              <a:rPr lang="en-US" sz="2400" dirty="0" smtClean="0">
+                <a:latin typeface="Calibri" pitchFamily="-72" charset="0"/>
+              </a:rPr>
+              <a:t>the </a:t>
+            </a:r>
+            <a:r>
+              <a:rPr lang="en-US" sz="2400" b="1" dirty="0" smtClean="0">
+                <a:latin typeface="Calibri" pitchFamily="-72" charset="0"/>
+              </a:rPr>
+              <a:t>$?</a:t>
+            </a:r>
+            <a:r>
+              <a:rPr lang="en-US" sz="2400" dirty="0" smtClean="0">
+                <a:latin typeface="Calibri" pitchFamily="-72" charset="0"/>
+              </a:rPr>
+              <a:t> variable</a:t>
+            </a:r>
+            <a:endParaRPr lang="en-US" sz="2400" dirty="0">
               <a:latin typeface="Calibri" pitchFamily="-72" charset="0"/>
             </a:endParaRPr>
           </a:p>
           <a:p>
-            <a:r>
-              <a:rPr lang="en-US" sz="2400">
+            <a:endParaRPr lang="en-US" sz="2400" dirty="0">
+              <a:latin typeface="Calibri" pitchFamily="-72" charset="0"/>
+            </a:endParaRPr>
+          </a:p>
+          <a:p>
+            <a:pPr algn="ctr"/>
+            <a:r>
+              <a:rPr lang="en-US" sz="2400" b="1" dirty="0">
                 <a:latin typeface="Calibri" pitchFamily="-72" charset="0"/>
               </a:rPr>
               <a:t>Either you control the exit status or it controls you</a:t>
@@ -7324,8 +7872,8 @@
 </p:sld>
 </file>
 
-<file path=ppt/slides/slide17.xml><?xml version="1.0" encoding="utf-8"?>
-<p:sld xmlns:a="http://schemas.openxmlformats.org/drawingml/2006/main" xmlns:r="http://schemas.openxmlformats.org/officeDocument/2006/relationships" xmlns:mc="http://schemas.openxmlformats.org/markup-compatibility/2006" xmlns:mv="urn:schemas-microsoft-com:mac:vml" xmlns:p="http://schemas.openxmlformats.org/presentationml/2006/main" mc:Ignorable="mv" mc:PreserveAttributes="mv:*">
+<file path=ppt/slides/slide19.xml><?xml version="1.0" encoding="utf-8"?>
+<p:sld xmlns:a="http://schemas.openxmlformats.org/drawingml/2006/main" xmlns:r="http://schemas.openxmlformats.org/officeDocument/2006/relationships" xmlns:p="http://schemas.openxmlformats.org/presentationml/2006/main">
   <p:cSld>
     <p:spTree>
       <p:nvGrpSpPr>
@@ -7534,11 +8082,6 @@
               </a:rPr>
               <a:t>The Exit Status – miserable failure</a:t>
             </a:r>
-            <a:endParaRPr lang="en-US" sz="3600" b="1" dirty="0">
-              <a:latin typeface="+mn-lt"/>
-              <a:ea typeface="+mn-ea"/>
-              <a:cs typeface="+mn-cs"/>
-            </a:endParaRPr>
           </a:p>
         </p:txBody>
       </p:sp>
@@ -7648,8 +8191,8 @@
 </p:sld>
 </file>
 
-<file path=ppt/slides/slide18.xml><?xml version="1.0" encoding="utf-8"?>
-<p:sld xmlns:a="http://schemas.openxmlformats.org/drawingml/2006/main" xmlns:r="http://schemas.openxmlformats.org/officeDocument/2006/relationships" xmlns:mc="http://schemas.openxmlformats.org/markup-compatibility/2006" xmlns:mv="urn:schemas-microsoft-com:mac:vml" xmlns:p="http://schemas.openxmlformats.org/presentationml/2006/main" mc:Ignorable="mv" mc:PreserveAttributes="mv:*">
+<file path=ppt/slides/slide2.xml><?xml version="1.0" encoding="utf-8"?>
+<p:sld xmlns:a="http://schemas.openxmlformats.org/drawingml/2006/main" xmlns:r="http://schemas.openxmlformats.org/officeDocument/2006/relationships" xmlns:p="http://schemas.openxmlformats.org/presentationml/2006/main">
   <p:cSld>
     <p:spTree>
       <p:nvGrpSpPr>
@@ -7667,6 +8210,413 @@
       </p:grpSpPr>
       <p:sp>
         <p:nvSpPr>
+          <p:cNvPr id="2" name="TextBox 1"/>
+          <p:cNvSpPr txBox="1"/>
+          <p:nvPr/>
+        </p:nvSpPr>
+        <p:spPr>
+          <a:xfrm>
+            <a:off x="1698625" y="166386"/>
+            <a:ext cx="5471720" cy="646331"/>
+          </a:xfrm>
+          <a:prstGeom prst="rect">
+            <a:avLst/>
+          </a:prstGeom>
+          <a:noFill/>
+        </p:spPr>
+        <p:txBody>
+          <a:bodyPr wrap="none">
+            <a:spAutoFit/>
+          </a:bodyPr>
+          <a:lstStyle/>
+          <a:p>
+            <a:pPr fontAlgn="auto">
+              <a:spcBef>
+                <a:spcPts val="0"/>
+              </a:spcBef>
+              <a:spcAft>
+                <a:spcPts val="0"/>
+              </a:spcAft>
+              <a:defRPr/>
+            </a:pPr>
+            <a:r>
+              <a:rPr lang="en-US" sz="3600" b="1" spc="600" dirty="0" smtClean="0">
+                <a:latin typeface="+mn-lt"/>
+                <a:ea typeface="+mn-ea"/>
+                <a:cs typeface="+mn-cs"/>
+              </a:rPr>
+              <a:t>Group, group, group</a:t>
+            </a:r>
+            <a:endParaRPr lang="en-US" sz="3600" b="1" spc="600" dirty="0">
+              <a:latin typeface="+mn-lt"/>
+              <a:ea typeface="+mn-ea"/>
+              <a:cs typeface="+mn-cs"/>
+            </a:endParaRPr>
+          </a:p>
+        </p:txBody>
+      </p:sp>
+      <p:sp>
+        <p:nvSpPr>
+          <p:cNvPr id="4" name="TextBox 4"/>
+          <p:cNvSpPr txBox="1">
+            <a:spLocks/>
+          </p:cNvSpPr>
+          <p:nvPr/>
+        </p:nvSpPr>
+        <p:spPr bwMode="auto">
+          <a:xfrm>
+            <a:off x="350762" y="1322884"/>
+            <a:ext cx="8599714" cy="4201150"/>
+          </a:xfrm>
+          <a:prstGeom prst="rect">
+            <a:avLst/>
+          </a:prstGeom>
+          <a:noFill/>
+          <a:ln w="9525">
+            <a:noFill/>
+            <a:miter lim="800000"/>
+            <a:headEnd/>
+            <a:tailEnd/>
+          </a:ln>
+        </p:spPr>
+        <p:txBody>
+          <a:bodyPr wrap="square">
+            <a:prstTxWarp prst="textNoShape">
+              <a:avLst/>
+            </a:prstTxWarp>
+            <a:spAutoFit/>
+          </a:bodyPr>
+          <a:lstStyle/>
+          <a:p>
+            <a:pPr>
+              <a:lnSpc>
+                <a:spcPct val="150000"/>
+              </a:lnSpc>
+            </a:pPr>
+            <a:r>
+              <a:rPr lang="en-US" sz="3600" dirty="0" smtClean="0">
+                <a:latin typeface="+mn-lt"/>
+                <a:ea typeface="Courier" pitchFamily="-72" charset="0"/>
+                <a:cs typeface="Courier" pitchFamily="-72" charset="0"/>
+              </a:rPr>
+              <a:t>One after the other:	</a:t>
+            </a:r>
+            <a:r>
+              <a:rPr lang="en-US" sz="3600" dirty="0">
+                <a:latin typeface="Courier" pitchFamily="-72" charset="0"/>
+                <a:ea typeface="Courier" pitchFamily="-72" charset="0"/>
+                <a:cs typeface="Courier" pitchFamily="-72" charset="0"/>
+              </a:rPr>
+              <a:t>cmd1 </a:t>
+            </a:r>
+            <a:r>
+              <a:rPr lang="en-US" sz="3600" b="1" dirty="0" smtClean="0">
+                <a:latin typeface="Courier" pitchFamily="-72" charset="0"/>
+                <a:ea typeface="Courier" pitchFamily="-72" charset="0"/>
+                <a:cs typeface="Courier" pitchFamily="-72" charset="0"/>
+              </a:rPr>
+              <a:t>;</a:t>
+            </a:r>
+            <a:r>
+              <a:rPr lang="en-US" sz="3600" dirty="0" smtClean="0">
+                <a:latin typeface="Courier" pitchFamily="-72" charset="0"/>
+                <a:ea typeface="Courier" pitchFamily="-72" charset="0"/>
+                <a:cs typeface="Courier" pitchFamily="-72" charset="0"/>
+              </a:rPr>
+              <a:t> </a:t>
+            </a:r>
+            <a:r>
+              <a:rPr lang="en-US" sz="3600" dirty="0">
+                <a:latin typeface="Courier" pitchFamily="-72" charset="0"/>
+                <a:ea typeface="Courier" pitchFamily="-72" charset="0"/>
+                <a:cs typeface="Courier" pitchFamily="-72" charset="0"/>
+              </a:rPr>
+              <a:t>cmd2</a:t>
+            </a:r>
+            <a:endParaRPr lang="en-US" sz="3600" dirty="0" smtClean="0">
+              <a:latin typeface="Courier" pitchFamily="-72" charset="0"/>
+              <a:ea typeface="Courier" pitchFamily="-72" charset="0"/>
+              <a:cs typeface="Courier" pitchFamily="-72" charset="0"/>
+            </a:endParaRPr>
+          </a:p>
+          <a:p>
+            <a:pPr>
+              <a:lnSpc>
+                <a:spcPct val="150000"/>
+              </a:lnSpc>
+            </a:pPr>
+            <a:r>
+              <a:rPr lang="en-US" sz="3600" dirty="0" smtClean="0">
+                <a:latin typeface="+mn-lt"/>
+                <a:ea typeface="Courier" pitchFamily="-72" charset="0"/>
+                <a:cs typeface="Courier" pitchFamily="-72" charset="0"/>
+              </a:rPr>
+              <a:t>One or both:</a:t>
+            </a:r>
+            <a:r>
+              <a:rPr lang="en-US" sz="3600" dirty="0" smtClean="0">
+                <a:latin typeface="Courier" pitchFamily="-72" charset="0"/>
+                <a:ea typeface="Courier" pitchFamily="-72" charset="0"/>
+                <a:cs typeface="Courier" pitchFamily="-72" charset="0"/>
+              </a:rPr>
+              <a:t>				cmd1 </a:t>
+            </a:r>
+            <a:r>
+              <a:rPr lang="en-US" sz="3600" b="1" dirty="0" smtClean="0">
+                <a:latin typeface="Courier" pitchFamily="-72" charset="0"/>
+                <a:ea typeface="Courier" pitchFamily="-72" charset="0"/>
+                <a:cs typeface="Courier" pitchFamily="-72" charset="0"/>
+              </a:rPr>
+              <a:t>&amp;&amp;</a:t>
+            </a:r>
+            <a:r>
+              <a:rPr lang="en-US" sz="3600" dirty="0" smtClean="0">
+                <a:latin typeface="Courier" pitchFamily="-72" charset="0"/>
+                <a:ea typeface="Courier" pitchFamily="-72" charset="0"/>
+                <a:cs typeface="Courier" pitchFamily="-72" charset="0"/>
+              </a:rPr>
+              <a:t> cmd2</a:t>
+            </a:r>
+          </a:p>
+          <a:p>
+            <a:pPr>
+              <a:lnSpc>
+                <a:spcPct val="150000"/>
+              </a:lnSpc>
+            </a:pPr>
+            <a:r>
+              <a:rPr lang="en-US" sz="3600" dirty="0" smtClean="0">
+                <a:latin typeface="+mn-lt"/>
+                <a:ea typeface="Courier" pitchFamily="-72" charset="0"/>
+                <a:cs typeface="Courier" pitchFamily="-72" charset="0"/>
+              </a:rPr>
+              <a:t>Only one of them:</a:t>
+            </a:r>
+            <a:r>
+              <a:rPr lang="en-US" sz="3600" dirty="0">
+                <a:latin typeface="+mn-lt"/>
+                <a:ea typeface="Courier" pitchFamily="-72" charset="0"/>
+                <a:cs typeface="Courier" pitchFamily="-72" charset="0"/>
+              </a:rPr>
+              <a:t>		</a:t>
+            </a:r>
+            <a:r>
+              <a:rPr lang="en-US" sz="3600" dirty="0" smtClean="0">
+                <a:latin typeface="Courier" pitchFamily="-72" charset="0"/>
+                <a:ea typeface="Courier" pitchFamily="-72" charset="0"/>
+                <a:cs typeface="Courier" pitchFamily="-72" charset="0"/>
+              </a:rPr>
+              <a:t>cmd1 </a:t>
+            </a:r>
+            <a:r>
+              <a:rPr lang="en-US" sz="3600" b="1" dirty="0" smtClean="0">
+                <a:latin typeface="Courier" pitchFamily="-72" charset="0"/>
+                <a:ea typeface="Courier" pitchFamily="-72" charset="0"/>
+                <a:cs typeface="Courier" pitchFamily="-72" charset="0"/>
+              </a:rPr>
+              <a:t>||</a:t>
+            </a:r>
+            <a:r>
+              <a:rPr lang="en-US" sz="3600" dirty="0" smtClean="0">
+                <a:latin typeface="Courier" pitchFamily="-72" charset="0"/>
+                <a:ea typeface="Courier" pitchFamily="-72" charset="0"/>
+                <a:cs typeface="Courier" pitchFamily="-72" charset="0"/>
+              </a:rPr>
+              <a:t> </a:t>
+            </a:r>
+            <a:r>
+              <a:rPr lang="en-US" sz="3600" dirty="0">
+                <a:latin typeface="Courier" pitchFamily="-72" charset="0"/>
+                <a:ea typeface="Courier" pitchFamily="-72" charset="0"/>
+                <a:cs typeface="Courier" pitchFamily="-72" charset="0"/>
+              </a:rPr>
+              <a:t>cmd2</a:t>
+            </a:r>
+          </a:p>
+          <a:p>
+            <a:pPr>
+              <a:lnSpc>
+                <a:spcPct val="150000"/>
+              </a:lnSpc>
+            </a:pPr>
+            <a:r>
+              <a:rPr lang="en-US" sz="3600" dirty="0" smtClean="0">
+                <a:latin typeface="+mn-lt"/>
+                <a:ea typeface="Courier" pitchFamily="-72" charset="0"/>
+                <a:cs typeface="Courier" pitchFamily="-72" charset="0"/>
+              </a:rPr>
+              <a:t>Cuddling (there):</a:t>
+            </a:r>
+            <a:r>
+              <a:rPr lang="en-US" sz="3600" dirty="0">
+                <a:latin typeface="+mn-lt"/>
+                <a:ea typeface="Courier" pitchFamily="-72" charset="0"/>
+                <a:cs typeface="Courier" pitchFamily="-72" charset="0"/>
+              </a:rPr>
+              <a:t>			</a:t>
+            </a:r>
+            <a:r>
+              <a:rPr lang="en-US" sz="3600" b="1" dirty="0" smtClean="0">
+                <a:latin typeface="+mn-lt"/>
+                <a:ea typeface="Courier" pitchFamily="-72" charset="0"/>
+                <a:cs typeface="Courier" pitchFamily="-72" charset="0"/>
+              </a:rPr>
+              <a:t>(</a:t>
+            </a:r>
+            <a:r>
+              <a:rPr lang="en-US" sz="3600" dirty="0" smtClean="0">
+                <a:latin typeface="+mn-lt"/>
+                <a:ea typeface="Courier" pitchFamily="-72" charset="0"/>
+                <a:cs typeface="Courier" pitchFamily="-72" charset="0"/>
+              </a:rPr>
+              <a:t> </a:t>
+            </a:r>
+            <a:r>
+              <a:rPr lang="en-US" sz="3600" dirty="0" smtClean="0">
+                <a:latin typeface="Courier" pitchFamily="-72" charset="0"/>
+                <a:ea typeface="Courier" pitchFamily="-72" charset="0"/>
+                <a:cs typeface="Courier" pitchFamily="-72" charset="0"/>
+              </a:rPr>
+              <a:t>cmd1 </a:t>
+            </a:r>
+            <a:r>
+              <a:rPr lang="en-US" sz="3600" b="1" dirty="0" smtClean="0">
+                <a:latin typeface="Courier" pitchFamily="-72" charset="0"/>
+                <a:ea typeface="Courier" pitchFamily="-72" charset="0"/>
+                <a:cs typeface="Courier" pitchFamily="-72" charset="0"/>
+              </a:rPr>
+              <a:t>;</a:t>
+            </a:r>
+            <a:r>
+              <a:rPr lang="en-US" sz="3600" dirty="0" smtClean="0">
+                <a:latin typeface="Courier" pitchFamily="-72" charset="0"/>
+                <a:ea typeface="Courier" pitchFamily="-72" charset="0"/>
+                <a:cs typeface="Courier" pitchFamily="-72" charset="0"/>
+              </a:rPr>
+              <a:t> cmd2 </a:t>
+            </a:r>
+            <a:r>
+              <a:rPr lang="en-US" sz="3600" b="1" dirty="0" smtClean="0">
+                <a:latin typeface="Courier" pitchFamily="-72" charset="0"/>
+                <a:ea typeface="Courier" pitchFamily="-72" charset="0"/>
+                <a:cs typeface="Courier" pitchFamily="-72" charset="0"/>
+              </a:rPr>
+              <a:t>)</a:t>
+            </a:r>
+            <a:endParaRPr lang="en-US" sz="3600" b="1" dirty="0">
+              <a:latin typeface="Courier" pitchFamily="-72" charset="0"/>
+              <a:ea typeface="Courier" pitchFamily="-72" charset="0"/>
+              <a:cs typeface="Courier" pitchFamily="-72" charset="0"/>
+            </a:endParaRPr>
+          </a:p>
+          <a:p>
+            <a:pPr>
+              <a:lnSpc>
+                <a:spcPct val="150000"/>
+              </a:lnSpc>
+            </a:pPr>
+            <a:r>
+              <a:rPr lang="en-US" sz="3600" dirty="0" smtClean="0">
+                <a:latin typeface="+mn-lt"/>
+                <a:ea typeface="Courier" pitchFamily="-72" charset="0"/>
+                <a:cs typeface="Courier" pitchFamily="-72" charset="0"/>
+              </a:rPr>
+              <a:t>Cuddling (here):</a:t>
+            </a:r>
+            <a:r>
+              <a:rPr lang="en-US" sz="3600" dirty="0">
+                <a:latin typeface="+mn-lt"/>
+                <a:ea typeface="Courier" pitchFamily="-72" charset="0"/>
+                <a:cs typeface="Courier" pitchFamily="-72" charset="0"/>
+              </a:rPr>
+              <a:t>			</a:t>
+            </a:r>
+            <a:r>
+              <a:rPr lang="en-US" sz="3600" b="1" dirty="0" smtClean="0">
+                <a:ea typeface="Courier" pitchFamily="-72" charset="0"/>
+                <a:cs typeface="Courier" pitchFamily="-72" charset="0"/>
+              </a:rPr>
+              <a:t>{</a:t>
+            </a:r>
+            <a:r>
+              <a:rPr lang="en-US" sz="3600" dirty="0" smtClean="0">
+                <a:ea typeface="Courier" pitchFamily="-72" charset="0"/>
+                <a:cs typeface="Courier" pitchFamily="-72" charset="0"/>
+              </a:rPr>
+              <a:t> </a:t>
+            </a:r>
+            <a:r>
+              <a:rPr lang="en-US" sz="3600" dirty="0">
+                <a:latin typeface="Courier" pitchFamily="-72" charset="0"/>
+                <a:ea typeface="Courier" pitchFamily="-72" charset="0"/>
+                <a:cs typeface="Courier" pitchFamily="-72" charset="0"/>
+              </a:rPr>
+              <a:t>cmd1 </a:t>
+            </a:r>
+            <a:r>
+              <a:rPr lang="en-US" sz="3600" b="1" dirty="0">
+                <a:latin typeface="Courier" pitchFamily="-72" charset="0"/>
+                <a:ea typeface="Courier" pitchFamily="-72" charset="0"/>
+                <a:cs typeface="Courier" pitchFamily="-72" charset="0"/>
+              </a:rPr>
+              <a:t>;</a:t>
+            </a:r>
+            <a:r>
+              <a:rPr lang="en-US" sz="3600" dirty="0">
+                <a:latin typeface="Courier" pitchFamily="-72" charset="0"/>
+                <a:ea typeface="Courier" pitchFamily="-72" charset="0"/>
+                <a:cs typeface="Courier" pitchFamily="-72" charset="0"/>
+              </a:rPr>
+              <a:t> cmd2 </a:t>
+            </a:r>
+            <a:r>
+              <a:rPr lang="en-US" sz="3600" b="1" dirty="0" smtClean="0">
+                <a:latin typeface="Courier" pitchFamily="-72" charset="0"/>
+                <a:ea typeface="Courier" pitchFamily="-72" charset="0"/>
+                <a:cs typeface="Courier" pitchFamily="-72" charset="0"/>
+              </a:rPr>
+              <a:t>}</a:t>
+            </a:r>
+            <a:endParaRPr lang="en-US" sz="3600" dirty="0" smtClean="0">
+              <a:latin typeface="Courier" pitchFamily="-72" charset="0"/>
+              <a:ea typeface="Courier" pitchFamily="-72" charset="0"/>
+              <a:cs typeface="Courier" pitchFamily="-72" charset="0"/>
+            </a:endParaRPr>
+          </a:p>
+        </p:txBody>
+      </p:sp>
+    </p:spTree>
+    <p:extLst>
+      <p:ext uri="{BB962C8B-B14F-4D97-AF65-F5344CB8AC3E}">
+        <p14:creationId xmlns:p14="http://schemas.microsoft.com/office/powerpoint/2010/main" val="1368891378"/>
+      </p:ext>
+    </p:extLst>
+  </p:cSld>
+  <p:clrMapOvr>
+    <a:masterClrMapping/>
+  </p:clrMapOvr>
+</p:sld>
+</file>
+
+<file path=ppt/slides/slide20.xml><?xml version="1.0" encoding="utf-8"?>
+<p:sld xmlns:a="http://schemas.openxmlformats.org/drawingml/2006/main" xmlns:r="http://schemas.openxmlformats.org/officeDocument/2006/relationships" xmlns:p="http://schemas.openxmlformats.org/presentationml/2006/main">
+  <p:cSld>
+    <p:spTree>
+      <p:nvGrpSpPr>
+        <p:cNvPr id="1" name=""/>
+        <p:cNvGrpSpPr/>
+        <p:nvPr/>
+      </p:nvGrpSpPr>
+      <p:grpSpPr>
+        <a:xfrm>
+          <a:off x="0" y="0"/>
+          <a:ext cx="0" cy="0"/>
+          <a:chOff x="0" y="0"/>
+          <a:chExt cx="0" cy="0"/>
+        </a:xfrm>
+      </p:grpSpPr>
+      <p:sp>
+        <p:nvSpPr>
           <p:cNvPr id="5" name="TextBox 4"/>
           <p:cNvSpPr txBox="1"/>
           <p:nvPr/>
@@ -7976,23 +8926,7 @@
                 <a:ea typeface="+mn-ea"/>
                 <a:cs typeface="Courier"/>
               </a:rPr>
-              <a:t>                                  </a:t>
-            </a:r>
-            <a:r>
-              <a:rPr lang="en-US" sz="1400" b="1" dirty="0">
-                <a:latin typeface="Courier"/>
-                <a:ea typeface="+mn-ea"/>
-                <a:cs typeface="Courier"/>
-              </a:rPr>
-              <a:t> </a:t>
-            </a:r>
-            <a:r>
-              <a:rPr lang="en-US" sz="1400" b="1" dirty="0">
-                <a:latin typeface="Courier"/>
-                <a:ea typeface="+mn-ea"/>
-                <a:cs typeface="Courier"/>
-              </a:rPr>
-              <a:t># this?</a:t>
+              <a:t>                                   # this?</a:t>
             </a:r>
           </a:p>
           <a:p>
@@ -8125,11 +9059,6 @@
               </a:rPr>
               <a:t>The Exit Status – good solution</a:t>
             </a:r>
-            <a:endParaRPr lang="en-US" sz="3600" b="1" dirty="0">
-              <a:latin typeface="+mn-lt"/>
-              <a:ea typeface="+mn-ea"/>
-              <a:cs typeface="+mn-cs"/>
-            </a:endParaRPr>
           </a:p>
         </p:txBody>
       </p:sp>
@@ -8237,8 +9166,8 @@
 </p:sld>
 </file>
 
-<file path=ppt/slides/slide2.xml><?xml version="1.0" encoding="utf-8"?>
-<p:sld xmlns:a="http://schemas.openxmlformats.org/drawingml/2006/main" xmlns:r="http://schemas.openxmlformats.org/officeDocument/2006/relationships" xmlns:mc="http://schemas.openxmlformats.org/markup-compatibility/2006" xmlns:mv="urn:schemas-microsoft-com:mac:vml" xmlns:p="http://schemas.openxmlformats.org/presentationml/2006/main" mc:Ignorable="mv" mc:PreserveAttributes="mv:*">
+<file path=ppt/slides/slide3.xml><?xml version="1.0" encoding="utf-8"?>
+<p:sld xmlns:a="http://schemas.openxmlformats.org/drawingml/2006/main" xmlns:r="http://schemas.openxmlformats.org/officeDocument/2006/relationships" xmlns:p="http://schemas.openxmlformats.org/presentationml/2006/main">
   <p:cSld>
     <p:spTree>
       <p:nvGrpSpPr>
@@ -8264,8 +9193,8 @@
         </p:nvSpPr>
         <p:spPr bwMode="auto">
           <a:xfrm>
-            <a:off x="1052513" y="890588"/>
-            <a:ext cx="7038975" cy="5035550"/>
+            <a:off x="1124844" y="890588"/>
+            <a:ext cx="6615869" cy="5035550"/>
           </a:xfrm>
           <a:prstGeom prst="rect">
             <a:avLst/>
@@ -8279,7 +9208,7 @@
           </a:ln>
         </p:spPr>
         <p:txBody>
-          <a:bodyPr>
+          <a:bodyPr wrap="square">
             <a:prstTxWarp prst="textNoShape">
               <a:avLst/>
             </a:prstTxWarp>
@@ -8288,7 +9217,7 @@
           <a:lstStyle/>
           <a:p>
             <a:r>
-              <a:rPr lang="en-US" sz="3600" b="1">
+              <a:rPr lang="en-US" sz="3600" b="1" dirty="0">
                 <a:latin typeface="Courier" pitchFamily="-72" charset="0"/>
                 <a:ea typeface="Courier" pitchFamily="-72" charset="0"/>
                 <a:cs typeface="Courier" pitchFamily="-72" charset="0"/>
@@ -8296,7 +9225,7 @@
               <a:t>if</a:t>
             </a:r>
             <a:r>
-              <a:rPr lang="en-US" sz="3600">
+              <a:rPr lang="en-US" sz="3600" dirty="0">
                 <a:latin typeface="Courier" pitchFamily="-72" charset="0"/>
                 <a:ea typeface="Courier" pitchFamily="-72" charset="0"/>
                 <a:cs typeface="Courier" pitchFamily="-72" charset="0"/>
@@ -8306,14 +9235,14 @@
           </a:p>
           <a:p>
             <a:r>
-              <a:rPr lang="en-US" sz="3600" b="1">
+              <a:rPr lang="en-US" sz="3600" b="1" dirty="0">
                 <a:latin typeface="Courier" pitchFamily="-72" charset="0"/>
                 <a:ea typeface="Courier" pitchFamily="-72" charset="0"/>
                 <a:cs typeface="Courier" pitchFamily="-72" charset="0"/>
               </a:rPr>
               <a:t>then</a:t>
             </a:r>
-            <a:endParaRPr lang="en-US" sz="3600">
+            <a:endParaRPr lang="en-US" sz="3600" dirty="0">
               <a:latin typeface="Courier" pitchFamily="-72" charset="0"/>
               <a:ea typeface="Courier" pitchFamily="-72" charset="0"/>
               <a:cs typeface="Courier" pitchFamily="-72" charset="0"/>
@@ -8321,7 +9250,7 @@
           </a:p>
           <a:p>
             <a:r>
-              <a:rPr lang="en-US" sz="3600">
+              <a:rPr lang="en-US" sz="3600" dirty="0">
                 <a:latin typeface="Courier" pitchFamily="-72" charset="0"/>
                 <a:ea typeface="Courier" pitchFamily="-72" charset="0"/>
                 <a:cs typeface="Courier" pitchFamily="-72" charset="0"/>
@@ -8331,7 +9260,7 @@
           </a:p>
           <a:p>
             <a:r>
-              <a:rPr lang="en-US" sz="3600" b="1" i="1">
+              <a:rPr lang="en-US" sz="3600" b="1" i="1" dirty="0" err="1">
                 <a:latin typeface="Courier" pitchFamily="-72" charset="0"/>
                 <a:ea typeface="Courier" pitchFamily="-72" charset="0"/>
                 <a:cs typeface="Courier" pitchFamily="-72" charset="0"/>
@@ -8339,14 +9268,14 @@
               <a:t>elif</a:t>
             </a:r>
             <a:r>
-              <a:rPr lang="en-US" sz="3600" i="1">
+              <a:rPr lang="en-US" sz="3600" i="1" dirty="0">
                 <a:latin typeface="Courier" pitchFamily="-72" charset="0"/>
                 <a:ea typeface="Courier" pitchFamily="-72" charset="0"/>
                 <a:cs typeface="Courier" pitchFamily="-72" charset="0"/>
               </a:rPr>
               <a:t> condition2</a:t>
             </a:r>
-            <a:endParaRPr lang="en-US" sz="3600">
+            <a:endParaRPr lang="en-US" sz="3600" dirty="0">
               <a:latin typeface="Courier" pitchFamily="-72" charset="0"/>
               <a:ea typeface="Courier" pitchFamily="-72" charset="0"/>
               <a:cs typeface="Courier" pitchFamily="-72" charset="0"/>
@@ -8354,14 +9283,14 @@
           </a:p>
           <a:p>
             <a:r>
-              <a:rPr lang="en-US" sz="3600" i="1">
+              <a:rPr lang="en-US" sz="3600" i="1" dirty="0">
                 <a:latin typeface="Courier" pitchFamily="-72" charset="0"/>
                 <a:ea typeface="Courier" pitchFamily="-72" charset="0"/>
                 <a:cs typeface="Courier" pitchFamily="-72" charset="0"/>
               </a:rPr>
               <a:t>  more statements</a:t>
             </a:r>
-            <a:endParaRPr lang="en-US" sz="3600">
+            <a:endParaRPr lang="en-US" sz="3600" dirty="0">
               <a:latin typeface="Courier" pitchFamily="-72" charset="0"/>
               <a:ea typeface="Courier" pitchFamily="-72" charset="0"/>
               <a:cs typeface="Courier" pitchFamily="-72" charset="0"/>
@@ -8369,14 +9298,14 @@
           </a:p>
           <a:p>
             <a:r>
-              <a:rPr lang="en-US" sz="3600" i="1">
+              <a:rPr lang="en-US" sz="3600" i="1" dirty="0">
                 <a:latin typeface="Courier" pitchFamily="-72" charset="0"/>
                 <a:ea typeface="Courier" pitchFamily="-72" charset="0"/>
                 <a:cs typeface="Courier" pitchFamily="-72" charset="0"/>
               </a:rPr>
               <a:t>[…]</a:t>
             </a:r>
-            <a:endParaRPr lang="en-US" sz="3600">
+            <a:endParaRPr lang="en-US" sz="3600" dirty="0">
               <a:latin typeface="Courier" pitchFamily="-72" charset="0"/>
               <a:ea typeface="Courier" pitchFamily="-72" charset="0"/>
               <a:cs typeface="Courier" pitchFamily="-72" charset="0"/>
@@ -8384,14 +9313,14 @@
           </a:p>
           <a:p>
             <a:r>
-              <a:rPr lang="en-US" sz="3600" b="1" i="1">
+              <a:rPr lang="en-US" sz="3600" b="1" i="1" dirty="0">
                 <a:latin typeface="Courier" pitchFamily="-72" charset="0"/>
                 <a:ea typeface="Courier" pitchFamily="-72" charset="0"/>
                 <a:cs typeface="Courier" pitchFamily="-72" charset="0"/>
               </a:rPr>
               <a:t>else</a:t>
             </a:r>
-            <a:endParaRPr lang="en-US" sz="3600">
+            <a:endParaRPr lang="en-US" sz="3600" dirty="0">
               <a:latin typeface="Courier" pitchFamily="-72" charset="0"/>
               <a:ea typeface="Courier" pitchFamily="-72" charset="0"/>
               <a:cs typeface="Courier" pitchFamily="-72" charset="0"/>
@@ -8399,14 +9328,14 @@
           </a:p>
           <a:p>
             <a:r>
-              <a:rPr lang="en-US" sz="3600" i="1">
+              <a:rPr lang="en-US" sz="3600" i="1" dirty="0">
                 <a:latin typeface="Courier" pitchFamily="-72" charset="0"/>
                 <a:ea typeface="Courier" pitchFamily="-72" charset="0"/>
                 <a:cs typeface="Courier" pitchFamily="-72" charset="0"/>
               </a:rPr>
               <a:t>  even more statements</a:t>
             </a:r>
-            <a:endParaRPr lang="en-US" sz="3600">
+            <a:endParaRPr lang="en-US" sz="3600" dirty="0">
               <a:latin typeface="Courier" pitchFamily="-72" charset="0"/>
               <a:ea typeface="Courier" pitchFamily="-72" charset="0"/>
               <a:cs typeface="Courier" pitchFamily="-72" charset="0"/>
@@ -8414,14 +9343,14 @@
           </a:p>
           <a:p>
             <a:r>
-              <a:rPr lang="en-US" sz="3600" b="1">
+              <a:rPr lang="en-US" sz="3600" b="1" dirty="0">
                 <a:latin typeface="Courier" pitchFamily="-72" charset="0"/>
                 <a:ea typeface="Courier" pitchFamily="-72" charset="0"/>
                 <a:cs typeface="Courier" pitchFamily="-72" charset="0"/>
               </a:rPr>
               <a:t>fi</a:t>
             </a:r>
-            <a:endParaRPr lang="en-US" sz="3600">
+            <a:endParaRPr lang="en-US" sz="3600" dirty="0">
               <a:latin typeface="Courier" pitchFamily="-72" charset="0"/>
               <a:ea typeface="Courier" pitchFamily="-72" charset="0"/>
               <a:cs typeface="Courier" pitchFamily="-72" charset="0"/>
@@ -8437,8 +9366,8 @@
 </p:sld>
 </file>
 
-<file path=ppt/slides/slide3.xml><?xml version="1.0" encoding="utf-8"?>
-<p:sld xmlns:a="http://schemas.openxmlformats.org/drawingml/2006/main" xmlns:r="http://schemas.openxmlformats.org/officeDocument/2006/relationships" xmlns:mc="http://schemas.openxmlformats.org/markup-compatibility/2006" xmlns:mv="urn:schemas-microsoft-com:mac:vml" xmlns:p="http://schemas.openxmlformats.org/presentationml/2006/main" mc:Ignorable="mv" mc:PreserveAttributes="mv:*">
+<file path=ppt/slides/slide4.xml><?xml version="1.0" encoding="utf-8"?>
+<p:sld xmlns:a="http://schemas.openxmlformats.org/drawingml/2006/main" xmlns:r="http://schemas.openxmlformats.org/officeDocument/2006/relationships" xmlns:p="http://schemas.openxmlformats.org/presentationml/2006/main">
   <p:cSld>
     <p:spTree>
       <p:nvGrpSpPr>
@@ -8464,8 +9393,8 @@
         </p:nvSpPr>
         <p:spPr bwMode="auto">
           <a:xfrm>
-            <a:off x="536575" y="627063"/>
-            <a:ext cx="8147050" cy="3387725"/>
+            <a:off x="791312" y="656370"/>
+            <a:ext cx="8004431" cy="3416320"/>
           </a:xfrm>
           <a:prstGeom prst="rect">
             <a:avLst/>
@@ -8479,7 +9408,7 @@
           </a:ln>
         </p:spPr>
         <p:txBody>
-          <a:bodyPr>
+          <a:bodyPr wrap="square">
             <a:prstTxWarp prst="textNoShape">
               <a:avLst/>
             </a:prstTxWarp>
@@ -8488,57 +9417,139 @@
           <a:lstStyle/>
           <a:p>
             <a:r>
-              <a:rPr lang="en-US" sz="3600">
+              <a:rPr lang="en-US" sz="3600" dirty="0">
                 <a:latin typeface="Courier" pitchFamily="-72" charset="0"/>
                 <a:ea typeface="Courier" pitchFamily="-72" charset="0"/>
                 <a:cs typeface="Courier" pitchFamily="-72" charset="0"/>
               </a:rPr>
-              <a:t>if grep –q root /etc/passwd</a:t>
-            </a:r>
-          </a:p>
-          <a:p>
-            <a:r>
-              <a:rPr lang="en-US" sz="3600">
+              <a:t>if </a:t>
+            </a:r>
+            <a:r>
+              <a:rPr lang="en-US" sz="3600" dirty="0" err="1">
                 <a:latin typeface="Courier" pitchFamily="-72" charset="0"/>
                 <a:ea typeface="Courier" pitchFamily="-72" charset="0"/>
                 <a:cs typeface="Courier" pitchFamily="-72" charset="0"/>
               </a:rPr>
-              <a:t>then</a:t>
-            </a:r>
-          </a:p>
-          <a:p>
-            <a:r>
-              <a:rPr lang="en-US" sz="3600">
+              <a:t>grep</a:t>
+            </a:r>
+            <a:r>
+              <a:rPr lang="en-US" sz="3600" dirty="0">
                 <a:latin typeface="Courier" pitchFamily="-72" charset="0"/>
                 <a:ea typeface="Courier" pitchFamily="-72" charset="0"/>
                 <a:cs typeface="Courier" pitchFamily="-72" charset="0"/>
               </a:rPr>
-              <a:t>  echo root user found</a:t>
-            </a:r>
-          </a:p>
-          <a:p>
-            <a:r>
-              <a:rPr lang="en-US" sz="3600">
+              <a:t> </a:t>
+            </a:r>
+            <a:r>
+              <a:rPr lang="en-US" sz="3600" dirty="0" smtClean="0">
                 <a:latin typeface="Courier" pitchFamily="-72" charset="0"/>
                 <a:ea typeface="Courier" pitchFamily="-72" charset="0"/>
                 <a:cs typeface="Courier" pitchFamily="-72" charset="0"/>
               </a:rPr>
-              <a:t>else</a:t>
-            </a:r>
-          </a:p>
-          <a:p>
-            <a:r>
-              <a:rPr lang="en-US" sz="3600">
+              <a:t>-</a:t>
+            </a:r>
+            <a:r>
+              <a:rPr lang="en-US" sz="3600" dirty="0" smtClean="0">
                 <a:latin typeface="Courier" pitchFamily="-72" charset="0"/>
                 <a:ea typeface="Courier" pitchFamily="-72" charset="0"/>
                 <a:cs typeface="Courier" pitchFamily="-72" charset="0"/>
               </a:rPr>
-              <a:t>  echo No root user found</a:t>
-            </a:r>
-          </a:p>
-          <a:p>
-            <a:r>
-              <a:rPr lang="en-US" sz="3600">
+              <a:t>q </a:t>
+            </a:r>
+            <a:r>
+              <a:rPr lang="en-US" sz="3600" dirty="0">
+                <a:latin typeface="Courier" pitchFamily="-72" charset="0"/>
+                <a:ea typeface="Courier" pitchFamily="-72" charset="0"/>
+                <a:cs typeface="Courier" pitchFamily="-72" charset="0"/>
+              </a:rPr>
+              <a:t>root /</a:t>
+            </a:r>
+            <a:r>
+              <a:rPr lang="en-US" sz="3600" dirty="0" err="1">
+                <a:latin typeface="Courier" pitchFamily="-72" charset="0"/>
+                <a:ea typeface="Courier" pitchFamily="-72" charset="0"/>
+                <a:cs typeface="Courier" pitchFamily="-72" charset="0"/>
+              </a:rPr>
+              <a:t>etc</a:t>
+            </a:r>
+            <a:r>
+              <a:rPr lang="en-US" sz="3600" dirty="0">
+                <a:latin typeface="Courier" pitchFamily="-72" charset="0"/>
+                <a:ea typeface="Courier" pitchFamily="-72" charset="0"/>
+                <a:cs typeface="Courier" pitchFamily="-72" charset="0"/>
+              </a:rPr>
+              <a:t>/</a:t>
+            </a:r>
+            <a:r>
+              <a:rPr lang="en-US" sz="3600" dirty="0" err="1">
+                <a:latin typeface="Courier" pitchFamily="-72" charset="0"/>
+                <a:ea typeface="Courier" pitchFamily="-72" charset="0"/>
+                <a:cs typeface="Courier" pitchFamily="-72" charset="0"/>
+              </a:rPr>
+              <a:t>passwd</a:t>
+            </a:r>
+            <a:endParaRPr lang="en-US" sz="3600" dirty="0">
+              <a:latin typeface="Courier" pitchFamily="-72" charset="0"/>
+              <a:ea typeface="Courier" pitchFamily="-72" charset="0"/>
+              <a:cs typeface="Courier" pitchFamily="-72" charset="0"/>
+            </a:endParaRPr>
+          </a:p>
+          <a:p>
+            <a:r>
+              <a:rPr lang="en-US" sz="3600" dirty="0">
+                <a:latin typeface="Courier" pitchFamily="-72" charset="0"/>
+                <a:ea typeface="Courier" pitchFamily="-72" charset="0"/>
+                <a:cs typeface="Courier" pitchFamily="-72" charset="0"/>
+              </a:rPr>
+              <a:t>then</a:t>
+            </a:r>
+          </a:p>
+          <a:p>
+            <a:r>
+              <a:rPr lang="en-US" sz="3600" dirty="0">
+                <a:latin typeface="Courier" pitchFamily="-72" charset="0"/>
+                <a:ea typeface="Courier" pitchFamily="-72" charset="0"/>
+                <a:cs typeface="Courier" pitchFamily="-72" charset="0"/>
+              </a:rPr>
+              <a:t>  echo root user found</a:t>
+            </a:r>
+          </a:p>
+          <a:p>
+            <a:r>
+              <a:rPr lang="en-US" sz="3600" dirty="0">
+                <a:latin typeface="Courier" pitchFamily="-72" charset="0"/>
+                <a:ea typeface="Courier" pitchFamily="-72" charset="0"/>
+                <a:cs typeface="Courier" pitchFamily="-72" charset="0"/>
+              </a:rPr>
+              <a:t>else</a:t>
+            </a:r>
+          </a:p>
+          <a:p>
+            <a:r>
+              <a:rPr lang="en-US" sz="3600" dirty="0">
+                <a:latin typeface="Courier" pitchFamily="-72" charset="0"/>
+                <a:ea typeface="Courier" pitchFamily="-72" charset="0"/>
+                <a:cs typeface="Courier" pitchFamily="-72" charset="0"/>
+              </a:rPr>
+              <a:t>  echo </a:t>
+            </a:r>
+            <a:r>
+              <a:rPr lang="en-US" sz="3600" dirty="0" smtClean="0">
+                <a:latin typeface="Courier" pitchFamily="-72" charset="0"/>
+                <a:ea typeface="Courier" pitchFamily="-72" charset="0"/>
+                <a:cs typeface="Courier" pitchFamily="-72" charset="0"/>
+              </a:rPr>
+              <a:t>“No root???”</a:t>
+            </a:r>
+            <a:endParaRPr lang="en-US" sz="3600" dirty="0">
+              <a:latin typeface="Courier" pitchFamily="-72" charset="0"/>
+              <a:ea typeface="Courier" pitchFamily="-72" charset="0"/>
+              <a:cs typeface="Courier" pitchFamily="-72" charset="0"/>
+            </a:endParaRPr>
+          </a:p>
+          <a:p>
+            <a:r>
+              <a:rPr lang="en-US" sz="3600" dirty="0">
                 <a:latin typeface="Courier" pitchFamily="-72" charset="0"/>
                 <a:ea typeface="Courier" pitchFamily="-72" charset="0"/>
                 <a:cs typeface="Courier" pitchFamily="-72" charset="0"/>
@@ -8556,8 +9567,8 @@
 </p:sld>
 </file>
 
-<file path=ppt/slides/slide4.xml><?xml version="1.0" encoding="utf-8"?>
-<p:sld xmlns:a="http://schemas.openxmlformats.org/drawingml/2006/main" xmlns:r="http://schemas.openxmlformats.org/officeDocument/2006/relationships" xmlns:mc="http://schemas.openxmlformats.org/markup-compatibility/2006" xmlns:mv="urn:schemas-microsoft-com:mac:vml" xmlns:p="http://schemas.openxmlformats.org/presentationml/2006/main" mc:Ignorable="mv" mc:PreserveAttributes="mv:*">
+<file path=ppt/slides/slide5.xml><?xml version="1.0" encoding="utf-8"?>
+<p:sld xmlns:a="http://schemas.openxmlformats.org/drawingml/2006/main" xmlns:r="http://schemas.openxmlformats.org/officeDocument/2006/relationships" xmlns:p="http://schemas.openxmlformats.org/presentationml/2006/main">
   <p:cSld>
     <p:spTree>
       <p:nvGrpSpPr>
@@ -9033,11 +10044,6 @@
               </a:rPr>
               <a:t>Twice the same</a:t>
             </a:r>
-            <a:endParaRPr lang="en-US" sz="3600" b="1" spc="600" dirty="0">
-              <a:latin typeface="+mn-lt"/>
-              <a:ea typeface="+mn-ea"/>
-              <a:cs typeface="+mn-cs"/>
-            </a:endParaRPr>
           </a:p>
         </p:txBody>
       </p:sp>
@@ -9049,8 +10055,8 @@
 </p:sld>
 </file>
 
-<file path=ppt/slides/slide5.xml><?xml version="1.0" encoding="utf-8"?>
-<p:sld xmlns:a="http://schemas.openxmlformats.org/drawingml/2006/main" xmlns:r="http://schemas.openxmlformats.org/officeDocument/2006/relationships" xmlns:mc="http://schemas.openxmlformats.org/markup-compatibility/2006" xmlns:mv="urn:schemas-microsoft-com:mac:vml" xmlns:p="http://schemas.openxmlformats.org/presentationml/2006/main" mc:Ignorable="mv" mc:PreserveAttributes="mv:*">
+<file path=ppt/slides/slide6.xml><?xml version="1.0" encoding="utf-8"?>
+<p:sld xmlns:a="http://schemas.openxmlformats.org/drawingml/2006/main" xmlns:r="http://schemas.openxmlformats.org/officeDocument/2006/relationships" xmlns:p="http://schemas.openxmlformats.org/presentationml/2006/main">
   <p:cSld>
     <p:spTree>
       <p:nvGrpSpPr>
@@ -9100,7 +10106,7 @@
           <a:lstStyle/>
           <a:p>
             <a:r>
-              <a:rPr lang="en-US" sz="3600" b="1">
+              <a:rPr lang="en-US" sz="3600" b="1" dirty="0">
                 <a:latin typeface="Courier" pitchFamily="-72" charset="0"/>
                 <a:ea typeface="Courier" pitchFamily="-72" charset="0"/>
                 <a:cs typeface="Courier" pitchFamily="-72" charset="0"/>
@@ -9108,7 +10114,7 @@
               <a:t>case </a:t>
             </a:r>
             <a:r>
-              <a:rPr lang="en-US" sz="3600">
+              <a:rPr lang="en-US" sz="3600" dirty="0">
                 <a:latin typeface="Courier" pitchFamily="-72" charset="0"/>
                 <a:ea typeface="Courier" pitchFamily="-72" charset="0"/>
                 <a:cs typeface="Courier" pitchFamily="-72" charset="0"/>
@@ -9116,7 +10122,7 @@
               <a:t>variable </a:t>
             </a:r>
             <a:r>
-              <a:rPr lang="en-US" sz="3600" b="1">
+              <a:rPr lang="en-US" sz="3600" b="1" dirty="0">
                 <a:latin typeface="Courier" pitchFamily="-72" charset="0"/>
                 <a:ea typeface="Courier" pitchFamily="-72" charset="0"/>
                 <a:cs typeface="Courier" pitchFamily="-72" charset="0"/>
@@ -9126,7 +10132,7 @@
           </a:p>
           <a:p>
             <a:r>
-              <a:rPr lang="en-US" sz="3600" b="1">
+              <a:rPr lang="en-US" sz="3600" b="1" dirty="0">
                 <a:latin typeface="Courier" pitchFamily="-72" charset="0"/>
                 <a:ea typeface="Courier" pitchFamily="-72" charset="0"/>
                 <a:cs typeface="Courier" pitchFamily="-72" charset="0"/>
@@ -9136,7 +10142,7 @@
           </a:p>
           <a:p>
             <a:r>
-              <a:rPr lang="en-US" sz="3600" b="1">
+              <a:rPr lang="en-US" sz="3600" b="1" dirty="0">
                 <a:latin typeface="Courier" pitchFamily="-72" charset="0"/>
                 <a:ea typeface="Courier" pitchFamily="-72" charset="0"/>
                 <a:cs typeface="Courier" pitchFamily="-72" charset="0"/>
@@ -9144,17 +10150,22 @@
               <a:t>    </a:t>
             </a:r>
             <a:r>
-              <a:rPr lang="en-US" sz="3600">
+              <a:rPr lang="en-US" sz="3600" dirty="0" smtClean="0">
                 <a:latin typeface="Courier" pitchFamily="-72" charset="0"/>
                 <a:ea typeface="Courier" pitchFamily="-72" charset="0"/>
                 <a:cs typeface="Courier" pitchFamily="-72" charset="0"/>
               </a:rPr>
-              <a:t>statements</a:t>
-            </a:r>
-          </a:p>
-          <a:p>
-            <a:r>
-              <a:rPr lang="en-US" sz="3600" b="1">
+              <a:t>statements_1</a:t>
+            </a:r>
+            <a:endParaRPr lang="en-US" sz="3600" dirty="0">
+              <a:latin typeface="Courier" pitchFamily="-72" charset="0"/>
+              <a:ea typeface="Courier" pitchFamily="-72" charset="0"/>
+              <a:cs typeface="Courier" pitchFamily="-72" charset="0"/>
+            </a:endParaRPr>
+          </a:p>
+          <a:p>
+            <a:r>
+              <a:rPr lang="en-US" sz="3600" b="1" dirty="0">
                 <a:latin typeface="Courier" pitchFamily="-72" charset="0"/>
                 <a:ea typeface="Courier" pitchFamily="-72" charset="0"/>
                 <a:cs typeface="Courier" pitchFamily="-72" charset="0"/>
@@ -9164,107 +10175,114 @@
           </a:p>
           <a:p>
             <a:r>
-              <a:rPr lang="en-US" sz="3600" b="1">
+              <a:rPr lang="en-US" sz="3600" b="1" i="1" dirty="0">
                 <a:latin typeface="Courier" pitchFamily="-72" charset="0"/>
                 <a:ea typeface="Courier" pitchFamily="-72" charset="0"/>
                 <a:cs typeface="Courier" pitchFamily="-72" charset="0"/>
               </a:rPr>
-              <a:t>  </a:t>
-            </a:r>
-            <a:r>
-              <a:rPr lang="en-US" sz="3600" b="1" i="1">
+              <a:t>  pattern2)</a:t>
+            </a:r>
+          </a:p>
+          <a:p>
+            <a:r>
+              <a:rPr lang="en-US" sz="3600" b="1" i="1" dirty="0">
                 <a:latin typeface="Courier" pitchFamily="-72" charset="0"/>
                 <a:ea typeface="Courier" pitchFamily="-72" charset="0"/>
                 <a:cs typeface="Courier" pitchFamily="-72" charset="0"/>
               </a:rPr>
-              <a:t>pattern2)</a:t>
-            </a:r>
-          </a:p>
-          <a:p>
-            <a:r>
-              <a:rPr lang="en-US" sz="3600" b="1" i="1">
+              <a:t>    </a:t>
+            </a:r>
+            <a:r>
+              <a:rPr lang="en-US" sz="3600" i="1" dirty="0" smtClean="0">
                 <a:latin typeface="Courier" pitchFamily="-72" charset="0"/>
                 <a:ea typeface="Courier" pitchFamily="-72" charset="0"/>
                 <a:cs typeface="Courier" pitchFamily="-72" charset="0"/>
               </a:rPr>
-              <a:t>    </a:t>
-            </a:r>
-            <a:r>
-              <a:rPr lang="en-US" sz="3600" i="1">
+              <a:t>statements_2</a:t>
+            </a:r>
+            <a:endParaRPr lang="en-US" sz="3600" i="1" dirty="0">
+              <a:latin typeface="Courier" pitchFamily="-72" charset="0"/>
+              <a:ea typeface="Courier" pitchFamily="-72" charset="0"/>
+              <a:cs typeface="Courier" pitchFamily="-72" charset="0"/>
+            </a:endParaRPr>
+          </a:p>
+          <a:p>
+            <a:r>
+              <a:rPr lang="en-US" sz="3600" b="1" i="1" dirty="0">
                 <a:latin typeface="Courier" pitchFamily="-72" charset="0"/>
                 <a:ea typeface="Courier" pitchFamily="-72" charset="0"/>
                 <a:cs typeface="Courier" pitchFamily="-72" charset="0"/>
               </a:rPr>
-              <a:t>statements</a:t>
-            </a:r>
-          </a:p>
-          <a:p>
-            <a:r>
-              <a:rPr lang="en-US" sz="3600" b="1" i="1">
+              <a:t>    ;;</a:t>
+            </a:r>
+          </a:p>
+          <a:p>
+            <a:r>
+              <a:rPr lang="en-US" sz="3600" b="1" i="1" dirty="0">
                 <a:latin typeface="Courier" pitchFamily="-72" charset="0"/>
                 <a:ea typeface="Courier" pitchFamily="-72" charset="0"/>
                 <a:cs typeface="Courier" pitchFamily="-72" charset="0"/>
               </a:rPr>
-              <a:t>    ;;</a:t>
-            </a:r>
-          </a:p>
-          <a:p>
-            <a:r>
-              <a:rPr lang="en-US" sz="3600" b="1" i="1">
+              <a:t>  […]</a:t>
+            </a:r>
+          </a:p>
+          <a:p>
+            <a:r>
+              <a:rPr lang="en-US" sz="3600" b="1" i="1" dirty="0">
                 <a:latin typeface="Courier" pitchFamily="-72" charset="0"/>
                 <a:ea typeface="Courier" pitchFamily="-72" charset="0"/>
                 <a:cs typeface="Courier" pitchFamily="-72" charset="0"/>
               </a:rPr>
-              <a:t>  […]</a:t>
-            </a:r>
-          </a:p>
-          <a:p>
-            <a:r>
-              <a:rPr lang="en-US" sz="3600" b="1" i="1">
+              <a:t>  *)</a:t>
+            </a:r>
+          </a:p>
+          <a:p>
+            <a:r>
+              <a:rPr lang="en-US" sz="3600" b="1" i="1" dirty="0">
                 <a:latin typeface="Courier" pitchFamily="-72" charset="0"/>
                 <a:ea typeface="Courier" pitchFamily="-72" charset="0"/>
                 <a:cs typeface="Courier" pitchFamily="-72" charset="0"/>
               </a:rPr>
-              <a:t>  *)</a:t>
-            </a:r>
-          </a:p>
-          <a:p>
-            <a:r>
-              <a:rPr lang="en-US" sz="3600" b="1" i="1">
+              <a:t>    </a:t>
+            </a:r>
+            <a:r>
+              <a:rPr lang="en-US" sz="3600" i="1" dirty="0" smtClean="0">
                 <a:latin typeface="Courier" pitchFamily="-72" charset="0"/>
                 <a:ea typeface="Courier" pitchFamily="-72" charset="0"/>
                 <a:cs typeface="Courier" pitchFamily="-72" charset="0"/>
               </a:rPr>
-              <a:t>    </a:t>
-            </a:r>
-            <a:r>
-              <a:rPr lang="en-US" sz="3600" i="1">
+              <a:t>statements_3</a:t>
+            </a:r>
+            <a:endParaRPr lang="en-US" sz="3600" i="1" dirty="0">
+              <a:latin typeface="Courier" pitchFamily="-72" charset="0"/>
+              <a:ea typeface="Courier" pitchFamily="-72" charset="0"/>
+              <a:cs typeface="Courier" pitchFamily="-72" charset="0"/>
+            </a:endParaRPr>
+          </a:p>
+          <a:p>
+            <a:r>
+              <a:rPr lang="en-US" sz="3600" b="1" i="1" dirty="0">
                 <a:latin typeface="Courier" pitchFamily="-72" charset="0"/>
                 <a:ea typeface="Courier" pitchFamily="-72" charset="0"/>
                 <a:cs typeface="Courier" pitchFamily="-72" charset="0"/>
               </a:rPr>
-              <a:t>statements</a:t>
-            </a:r>
-          </a:p>
-          <a:p>
-            <a:r>
-              <a:rPr lang="en-US" sz="3600" b="1" i="1">
+              <a:t>    ;;</a:t>
+            </a:r>
+          </a:p>
+          <a:p>
+            <a:r>
+              <a:rPr lang="en-US" sz="3600" b="1" dirty="0" err="1">
                 <a:latin typeface="Courier" pitchFamily="-72" charset="0"/>
                 <a:ea typeface="Courier" pitchFamily="-72" charset="0"/>
                 <a:cs typeface="Courier" pitchFamily="-72" charset="0"/>
               </a:rPr>
-              <a:t>    ;;</a:t>
-            </a:r>
-          </a:p>
-          <a:p>
-            <a:r>
-              <a:rPr lang="en-US" sz="3600" b="1">
-                <a:latin typeface="Courier" pitchFamily="-72" charset="0"/>
-                <a:ea typeface="Courier" pitchFamily="-72" charset="0"/>
-                <a:cs typeface="Courier" pitchFamily="-72" charset="0"/>
-              </a:rPr>
               <a:t>esac</a:t>
             </a:r>
+            <a:endParaRPr lang="en-US" sz="3600" b="1" dirty="0">
+              <a:latin typeface="Courier" pitchFamily="-72" charset="0"/>
+              <a:ea typeface="Courier" pitchFamily="-72" charset="0"/>
+              <a:cs typeface="Courier" pitchFamily="-72" charset="0"/>
+            </a:endParaRPr>
           </a:p>
         </p:txBody>
       </p:sp>
@@ -9276,8 +10294,8 @@
 </p:sld>
 </file>
 
-<file path=ppt/slides/slide6.xml><?xml version="1.0" encoding="utf-8"?>
-<p:sld xmlns:a="http://schemas.openxmlformats.org/drawingml/2006/main" xmlns:r="http://schemas.openxmlformats.org/officeDocument/2006/relationships" xmlns:mc="http://schemas.openxmlformats.org/markup-compatibility/2006" xmlns:mv="urn:schemas-microsoft-com:mac:vml" xmlns:p="http://schemas.openxmlformats.org/presentationml/2006/main" mc:Ignorable="mv" mc:PreserveAttributes="mv:*">
+<file path=ppt/slides/slide7.xml><?xml version="1.0" encoding="utf-8"?>
+<p:sld xmlns:a="http://schemas.openxmlformats.org/drawingml/2006/main" xmlns:r="http://schemas.openxmlformats.org/officeDocument/2006/relationships" xmlns:p="http://schemas.openxmlformats.org/presentationml/2006/main">
   <p:cSld>
     <p:spTree>
       <p:nvGrpSpPr>
@@ -9327,7 +10345,7 @@
           <a:lstStyle/>
           <a:p>
             <a:r>
-              <a:rPr lang="en-US" sz="2400">
+              <a:rPr lang="en-US" sz="2400" dirty="0">
                 <a:latin typeface="Courier" pitchFamily="-72" charset="0"/>
                 <a:ea typeface="Courier" pitchFamily="-72" charset="0"/>
                 <a:cs typeface="Courier" pitchFamily="-72" charset="0"/>
@@ -9337,72 +10355,128 @@
           </a:p>
           <a:p>
             <a:r>
-              <a:rPr lang="en-US" sz="2400">
+              <a:rPr lang="en-US" sz="2400" dirty="0">
                 <a:latin typeface="Courier" pitchFamily="-72" charset="0"/>
                 <a:ea typeface="Courier" pitchFamily="-72" charset="0"/>
                 <a:cs typeface="Courier" pitchFamily="-72" charset="0"/>
               </a:rPr>
-              <a:t> */opt/* | */usr/* )</a:t>
-            </a:r>
-          </a:p>
-          <a:p>
-            <a:r>
-              <a:rPr lang="en-US" sz="2400">
+              <a:t> */opt/* | */</a:t>
+            </a:r>
+            <a:r>
+              <a:rPr lang="en-US" sz="2400" dirty="0" err="1">
                 <a:latin typeface="Courier" pitchFamily="-72" charset="0"/>
                 <a:ea typeface="Courier" pitchFamily="-72" charset="0"/>
                 <a:cs typeface="Courier" pitchFamily="-72" charset="0"/>
               </a:rPr>
-              <a:t>    echo /opt/ or /usr/ paths found in \$PATH</a:t>
-            </a:r>
-          </a:p>
-          <a:p>
-            <a:r>
-              <a:rPr lang="en-US" sz="2400">
+              <a:t>usr</a:t>
+            </a:r>
+            <a:r>
+              <a:rPr lang="en-US" sz="2400" dirty="0">
                 <a:latin typeface="Courier" pitchFamily="-72" charset="0"/>
                 <a:ea typeface="Courier" pitchFamily="-72" charset="0"/>
                 <a:cs typeface="Courier" pitchFamily="-72" charset="0"/>
               </a:rPr>
-              <a:t>    ;;</a:t>
-            </a:r>
-          </a:p>
-          <a:p>
-            <a:r>
-              <a:rPr lang="en-US" sz="2400">
+              <a:t>/* )</a:t>
+            </a:r>
+          </a:p>
+          <a:p>
+            <a:r>
+              <a:rPr lang="en-US" sz="2400" dirty="0">
                 <a:latin typeface="Courier" pitchFamily="-72" charset="0"/>
                 <a:ea typeface="Courier" pitchFamily="-72" charset="0"/>
                 <a:cs typeface="Courier" pitchFamily="-72" charset="0"/>
               </a:rPr>
-              <a:t> *)</a:t>
-            </a:r>
-          </a:p>
-          <a:p>
-            <a:r>
-              <a:rPr lang="en-US" sz="2400">
+              <a:t>    echo /opt/ or /</a:t>
+            </a:r>
+            <a:r>
+              <a:rPr lang="en-US" sz="2400" dirty="0" err="1">
                 <a:latin typeface="Courier" pitchFamily="-72" charset="0"/>
                 <a:ea typeface="Courier" pitchFamily="-72" charset="0"/>
                 <a:cs typeface="Courier" pitchFamily="-72" charset="0"/>
               </a:rPr>
-              <a:t>    echo ‘/opt and /usr are not contained in $PATH’</a:t>
-            </a:r>
-          </a:p>
-          <a:p>
-            <a:r>
-              <a:rPr lang="en-US" sz="2400">
+              <a:t>usr</a:t>
+            </a:r>
+            <a:r>
+              <a:rPr lang="en-US" sz="2400" dirty="0">
                 <a:latin typeface="Courier" pitchFamily="-72" charset="0"/>
                 <a:ea typeface="Courier" pitchFamily="-72" charset="0"/>
                 <a:cs typeface="Courier" pitchFamily="-72" charset="0"/>
               </a:rPr>
-              <a:t>    ;;</a:t>
-            </a:r>
-          </a:p>
-          <a:p>
-            <a:r>
-              <a:rPr lang="en-US" sz="2400">
+              <a:t>/ paths found in \$PATH</a:t>
+            </a:r>
+          </a:p>
+          <a:p>
+            <a:r>
+              <a:rPr lang="en-US" sz="2400" dirty="0">
                 <a:latin typeface="Courier" pitchFamily="-72" charset="0"/>
                 <a:ea typeface="Courier" pitchFamily="-72" charset="0"/>
                 <a:cs typeface="Courier" pitchFamily="-72" charset="0"/>
               </a:rPr>
-              <a:t>esac </a:t>
+              <a:t>    ;;</a:t>
+            </a:r>
+          </a:p>
+          <a:p>
+            <a:r>
+              <a:rPr lang="en-US" sz="2400" dirty="0">
+                <a:latin typeface="Courier" pitchFamily="-72" charset="0"/>
+                <a:ea typeface="Courier" pitchFamily="-72" charset="0"/>
+                <a:cs typeface="Courier" pitchFamily="-72" charset="0"/>
+              </a:rPr>
+              <a:t> *)</a:t>
+            </a:r>
+          </a:p>
+          <a:p>
+            <a:r>
+              <a:rPr lang="en-US" sz="2400" dirty="0">
+                <a:latin typeface="Courier" pitchFamily="-72" charset="0"/>
+                <a:ea typeface="Courier" pitchFamily="-72" charset="0"/>
+                <a:cs typeface="Courier" pitchFamily="-72" charset="0"/>
+              </a:rPr>
+              <a:t>    echo ‘/opt and /</a:t>
+            </a:r>
+            <a:r>
+              <a:rPr lang="en-US" sz="2400" dirty="0" err="1">
+                <a:latin typeface="Courier" pitchFamily="-72" charset="0"/>
+                <a:ea typeface="Courier" pitchFamily="-72" charset="0"/>
+                <a:cs typeface="Courier" pitchFamily="-72" charset="0"/>
+              </a:rPr>
+              <a:t>usr</a:t>
+            </a:r>
+            <a:r>
+              <a:rPr lang="en-US" sz="2400" dirty="0">
+                <a:latin typeface="Courier" pitchFamily="-72" charset="0"/>
+                <a:ea typeface="Courier" pitchFamily="-72" charset="0"/>
+                <a:cs typeface="Courier" pitchFamily="-72" charset="0"/>
+              </a:rPr>
+              <a:t> are not contained in $PATH’</a:t>
+            </a:r>
+          </a:p>
+          <a:p>
+            <a:r>
+              <a:rPr lang="en-US" sz="2400" dirty="0">
+                <a:latin typeface="Courier" pitchFamily="-72" charset="0"/>
+                <a:ea typeface="Courier" pitchFamily="-72" charset="0"/>
+                <a:cs typeface="Courier" pitchFamily="-72" charset="0"/>
+              </a:rPr>
+              <a:t>    ;;</a:t>
+            </a:r>
+          </a:p>
+          <a:p>
+            <a:r>
+              <a:rPr lang="en-US" sz="2400" dirty="0" err="1">
+                <a:latin typeface="Courier" pitchFamily="-72" charset="0"/>
+                <a:ea typeface="Courier" pitchFamily="-72" charset="0"/>
+                <a:cs typeface="Courier" pitchFamily="-72" charset="0"/>
+              </a:rPr>
+              <a:t>esac</a:t>
+            </a:r>
+            <a:r>
+              <a:rPr lang="en-US" sz="2400" dirty="0">
+                <a:latin typeface="Courier" pitchFamily="-72" charset="0"/>
+                <a:ea typeface="Courier" pitchFamily="-72" charset="0"/>
+                <a:cs typeface="Courier" pitchFamily="-72" charset="0"/>
+              </a:rPr>
+              <a:t> </a:t>
             </a:r>
           </a:p>
         </p:txBody>
@@ -9415,8 +10489,8 @@
 </p:sld>
 </file>
 
-<file path=ppt/slides/slide7.xml><?xml version="1.0" encoding="utf-8"?>
-<p:sld xmlns:a="http://schemas.openxmlformats.org/drawingml/2006/main" xmlns:r="http://schemas.openxmlformats.org/officeDocument/2006/relationships" xmlns:mc="http://schemas.openxmlformats.org/markup-compatibility/2006" xmlns:mv="urn:schemas-microsoft-com:mac:vml" xmlns:p="http://schemas.openxmlformats.org/presentationml/2006/main" mc:Ignorable="mv" mc:PreserveAttributes="mv:*">
+<file path=ppt/slides/slide8.xml><?xml version="1.0" encoding="utf-8"?>
+<p:sld xmlns:a="http://schemas.openxmlformats.org/drawingml/2006/main" xmlns:r="http://schemas.openxmlformats.org/officeDocument/2006/relationships" xmlns:p="http://schemas.openxmlformats.org/presentationml/2006/main">
   <p:cSld>
     <p:spTree>
       <p:nvGrpSpPr>
@@ -9466,7 +10540,7 @@
           <a:lstStyle/>
           <a:p>
             <a:r>
-              <a:rPr lang="en-US" sz="3600" b="1">
+              <a:rPr lang="en-US" sz="3600" b="1" dirty="0">
                 <a:latin typeface="Courier" pitchFamily="-72" charset="0"/>
                 <a:ea typeface="Courier" pitchFamily="-72" charset="0"/>
                 <a:cs typeface="Courier" pitchFamily="-72" charset="0"/>
@@ -9474,7 +10548,7 @@
               <a:t>for </a:t>
             </a:r>
             <a:r>
-              <a:rPr lang="en-US" sz="3600">
+              <a:rPr lang="en-US" sz="3600" dirty="0">
                 <a:latin typeface="Courier" pitchFamily="-72" charset="0"/>
                 <a:ea typeface="Courier" pitchFamily="-72" charset="0"/>
                 <a:cs typeface="Courier" pitchFamily="-72" charset="0"/>
@@ -9482,7 +10556,7 @@
               <a:t>variable </a:t>
             </a:r>
             <a:r>
-              <a:rPr lang="en-US" sz="3600" b="1" i="1">
+              <a:rPr lang="en-US" sz="3600" b="1" dirty="0">
                 <a:latin typeface="Courier" pitchFamily="-72" charset="0"/>
                 <a:ea typeface="Courier" pitchFamily="-72" charset="0"/>
                 <a:cs typeface="Courier" pitchFamily="-72" charset="0"/>
@@ -9490,7 +10564,7 @@
               <a:t>in </a:t>
             </a:r>
             <a:r>
-              <a:rPr lang="en-US" sz="3600" i="1">
+              <a:rPr lang="en-US" sz="3600" dirty="0">
                 <a:latin typeface="Courier" pitchFamily="-72" charset="0"/>
                 <a:ea typeface="Courier" pitchFamily="-72" charset="0"/>
                 <a:cs typeface="Courier" pitchFamily="-72" charset="0"/>
@@ -9500,7 +10574,7 @@
           </a:p>
           <a:p>
             <a:r>
-              <a:rPr lang="en-US" sz="3600" b="1">
+              <a:rPr lang="en-US" sz="3600" b="1" dirty="0">
                 <a:latin typeface="Courier" pitchFamily="-72" charset="0"/>
                 <a:ea typeface="Courier" pitchFamily="-72" charset="0"/>
                 <a:cs typeface="Courier" pitchFamily="-72" charset="0"/>
@@ -9510,7 +10584,7 @@
           </a:p>
           <a:p>
             <a:r>
-              <a:rPr lang="en-US" sz="3600" b="1">
+              <a:rPr lang="en-US" sz="3600" b="1" dirty="0">
                 <a:latin typeface="Courier" pitchFamily="-72" charset="0"/>
                 <a:ea typeface="Courier" pitchFamily="-72" charset="0"/>
                 <a:cs typeface="Courier" pitchFamily="-72" charset="0"/>
@@ -9518,7 +10592,7 @@
               <a:t>  </a:t>
             </a:r>
             <a:r>
-              <a:rPr lang="en-US" sz="3600">
+              <a:rPr lang="en-US" sz="3600" dirty="0">
                 <a:latin typeface="Courier" pitchFamily="-72" charset="0"/>
                 <a:ea typeface="Courier" pitchFamily="-72" charset="0"/>
                 <a:cs typeface="Courier" pitchFamily="-72" charset="0"/>
@@ -9528,7 +10602,7 @@
           </a:p>
           <a:p>
             <a:r>
-              <a:rPr lang="en-US" sz="3600" b="1">
+              <a:rPr lang="en-US" sz="3600" b="1" dirty="0">
                 <a:latin typeface="Courier" pitchFamily="-72" charset="0"/>
                 <a:ea typeface="Courier" pitchFamily="-72" charset="0"/>
                 <a:cs typeface="Courier" pitchFamily="-72" charset="0"/>
@@ -9546,8 +10620,8 @@
 </p:sld>
 </file>
 
-<file path=ppt/slides/slide8.xml><?xml version="1.0" encoding="utf-8"?>
-<p:sld xmlns:a="http://schemas.openxmlformats.org/drawingml/2006/main" xmlns:r="http://schemas.openxmlformats.org/officeDocument/2006/relationships" xmlns:mc="http://schemas.openxmlformats.org/markup-compatibility/2006" xmlns:mv="urn:schemas-microsoft-com:mac:vml" xmlns:p="http://schemas.openxmlformats.org/presentationml/2006/main" mc:Ignorable="mv" mc:PreserveAttributes="mv:*">
+<file path=ppt/slides/slide9.xml><?xml version="1.0" encoding="utf-8"?>
+<p:sld xmlns:a="http://schemas.openxmlformats.org/drawingml/2006/main" xmlns:r="http://schemas.openxmlformats.org/officeDocument/2006/relationships" xmlns:p="http://schemas.openxmlformats.org/presentationml/2006/main">
   <p:cSld>
     <p:spTree>
       <p:nvGrpSpPr>
@@ -9829,7 +10903,7 @@
         </p:nvSpPr>
         <p:spPr>
           <a:xfrm>
-            <a:off x="1698625" y="33338"/>
+            <a:off x="1698625" y="166386"/>
             <a:ext cx="5746750" cy="646112"/>
           </a:xfrm>
           <a:prstGeom prst="rect">
@@ -9859,189 +10933,6 @@
                 <a:cs typeface="+mn-cs"/>
               </a:rPr>
               <a:t>Twice the same again</a:t>
-            </a:r>
-            <a:endParaRPr lang="en-US" sz="3600" b="1" spc="600" dirty="0">
-              <a:latin typeface="+mn-lt"/>
-              <a:ea typeface="+mn-ea"/>
-              <a:cs typeface="+mn-cs"/>
-            </a:endParaRPr>
-          </a:p>
-        </p:txBody>
-      </p:sp>
-    </p:spTree>
-  </p:cSld>
-  <p:clrMapOvr>
-    <a:masterClrMapping/>
-  </p:clrMapOvr>
-</p:sld>
-</file>
-
-<file path=ppt/slides/slide9.xml><?xml version="1.0" encoding="utf-8"?>
-<p:sld xmlns:a="http://schemas.openxmlformats.org/drawingml/2006/main" xmlns:r="http://schemas.openxmlformats.org/officeDocument/2006/relationships" xmlns:mc="http://schemas.openxmlformats.org/markup-compatibility/2006" xmlns:mv="urn:schemas-microsoft-com:mac:vml" xmlns:p="http://schemas.openxmlformats.org/presentationml/2006/main" mc:Ignorable="mv" mc:PreserveAttributes="mv:*">
-  <p:cSld>
-    <p:spTree>
-      <p:nvGrpSpPr>
-        <p:cNvPr id="1" name=""/>
-        <p:cNvGrpSpPr/>
-        <p:nvPr/>
-      </p:nvGrpSpPr>
-      <p:grpSpPr>
-        <a:xfrm>
-          <a:off x="0" y="0"/>
-          <a:ext cx="0" cy="0"/>
-          <a:chOff x="0" y="0"/>
-          <a:chExt cx="0" cy="0"/>
-        </a:xfrm>
-      </p:grpSpPr>
-      <p:sp>
-        <p:nvSpPr>
-          <p:cNvPr id="21505" name="TextBox 4"/>
-          <p:cNvSpPr txBox="1">
-            <a:spLocks/>
-          </p:cNvSpPr>
-          <p:nvPr/>
-        </p:nvSpPr>
-        <p:spPr bwMode="auto">
-          <a:xfrm>
-            <a:off x="568325" y="635000"/>
-            <a:ext cx="8321675" cy="5078413"/>
-          </a:xfrm>
-          <a:prstGeom prst="rect">
-            <a:avLst/>
-          </a:prstGeom>
-          <a:noFill/>
-          <a:ln w="9525">
-            <a:noFill/>
-            <a:miter lim="800000"/>
-            <a:headEnd/>
-            <a:tailEnd/>
-          </a:ln>
-        </p:spPr>
-        <p:txBody>
-          <a:bodyPr>
-            <a:prstTxWarp prst="textNoShape">
-              <a:avLst/>
-            </a:prstTxWarp>
-            <a:spAutoFit/>
-          </a:bodyPr>
-          <a:lstStyle/>
-          <a:p>
-            <a:r>
-              <a:rPr lang="en-US" sz="3600" b="1">
-                <a:latin typeface="Courier" pitchFamily="-72" charset="0"/>
-                <a:ea typeface="Courier" pitchFamily="-72" charset="0"/>
-                <a:cs typeface="Courier" pitchFamily="-72" charset="0"/>
-              </a:rPr>
-              <a:t>while </a:t>
-            </a:r>
-            <a:r>
-              <a:rPr lang="en-US" sz="3600">
-                <a:latin typeface="Courier" pitchFamily="-72" charset="0"/>
-                <a:ea typeface="Courier" pitchFamily="-72" charset="0"/>
-                <a:cs typeface="Courier" pitchFamily="-72" charset="0"/>
-              </a:rPr>
-              <a:t>condition</a:t>
-            </a:r>
-          </a:p>
-          <a:p>
-            <a:r>
-              <a:rPr lang="en-US" sz="3600" b="1">
-                <a:latin typeface="Courier" pitchFamily="-72" charset="0"/>
-                <a:ea typeface="Courier" pitchFamily="-72" charset="0"/>
-                <a:cs typeface="Courier" pitchFamily="-72" charset="0"/>
-              </a:rPr>
-              <a:t>do</a:t>
-            </a:r>
-          </a:p>
-          <a:p>
-            <a:r>
-              <a:rPr lang="en-US" sz="3600" b="1">
-                <a:latin typeface="Courier" pitchFamily="-72" charset="0"/>
-                <a:ea typeface="Courier" pitchFamily="-72" charset="0"/>
-                <a:cs typeface="Courier" pitchFamily="-72" charset="0"/>
-              </a:rPr>
-              <a:t>  </a:t>
-            </a:r>
-            <a:r>
-              <a:rPr lang="en-US" sz="3600">
-                <a:latin typeface="Courier" pitchFamily="-72" charset="0"/>
-                <a:ea typeface="Courier" pitchFamily="-72" charset="0"/>
-                <a:cs typeface="Courier" pitchFamily="-72" charset="0"/>
-              </a:rPr>
-              <a:t>statements</a:t>
-            </a:r>
-          </a:p>
-          <a:p>
-            <a:r>
-              <a:rPr lang="en-US" sz="3600" b="1">
-                <a:latin typeface="Courier" pitchFamily="-72" charset="0"/>
-                <a:ea typeface="Courier" pitchFamily="-72" charset="0"/>
-                <a:cs typeface="Courier" pitchFamily="-72" charset="0"/>
-              </a:rPr>
-              <a:t>Done</a:t>
-            </a:r>
-          </a:p>
-          <a:p>
-            <a:endParaRPr lang="en-US" sz="3600" b="1">
-              <a:latin typeface="Courier" pitchFamily="-72" charset="0"/>
-              <a:ea typeface="Courier" pitchFamily="-72" charset="0"/>
-              <a:cs typeface="Courier" pitchFamily="-72" charset="0"/>
-            </a:endParaRPr>
-          </a:p>
-          <a:p>
-            <a:r>
-              <a:rPr lang="en-US" sz="3600" b="1">
-                <a:latin typeface="Courier" pitchFamily="-72" charset="0"/>
-                <a:ea typeface="Courier" pitchFamily="-72" charset="0"/>
-                <a:cs typeface="Courier" pitchFamily="-72" charset="0"/>
-              </a:rPr>
-              <a:t>until </a:t>
-            </a:r>
-            <a:r>
-              <a:rPr lang="en-US" sz="3600">
-                <a:latin typeface="Courier" pitchFamily="-72" charset="0"/>
-                <a:ea typeface="Courier" pitchFamily="-72" charset="0"/>
-                <a:cs typeface="Courier" pitchFamily="-72" charset="0"/>
-              </a:rPr>
-              <a:t>condition</a:t>
-            </a:r>
-          </a:p>
-          <a:p>
-            <a:r>
-              <a:rPr lang="en-US" sz="3600" b="1">
-                <a:latin typeface="Courier" pitchFamily="-72" charset="0"/>
-                <a:ea typeface="Courier" pitchFamily="-72" charset="0"/>
-                <a:cs typeface="Courier" pitchFamily="-72" charset="0"/>
-              </a:rPr>
-              <a:t>do</a:t>
-            </a:r>
-          </a:p>
-          <a:p>
-            <a:r>
-              <a:rPr lang="en-US" sz="3600" b="1">
-                <a:latin typeface="Courier" pitchFamily="-72" charset="0"/>
-                <a:ea typeface="Courier" pitchFamily="-72" charset="0"/>
-                <a:cs typeface="Courier" pitchFamily="-72" charset="0"/>
-              </a:rPr>
-              <a:t>  </a:t>
-            </a:r>
-            <a:r>
-              <a:rPr lang="en-US" sz="3600">
-                <a:latin typeface="Courier" pitchFamily="-72" charset="0"/>
-                <a:ea typeface="Courier" pitchFamily="-72" charset="0"/>
-                <a:cs typeface="Courier" pitchFamily="-72" charset="0"/>
-              </a:rPr>
-              <a:t>statements</a:t>
-            </a:r>
-          </a:p>
-          <a:p>
-            <a:r>
-              <a:rPr lang="en-US" sz="3600" b="1">
-                <a:latin typeface="Courier" pitchFamily="-72" charset="0"/>
-                <a:ea typeface="Courier" pitchFamily="-72" charset="0"/>
-                <a:cs typeface="Courier" pitchFamily="-72" charset="0"/>
-              </a:rPr>
-              <a:t>done</a:t>
             </a:r>
           </a:p>
         </p:txBody>

</xml_diff>